<commit_message>
Reduzierung Text tag 2 Aufgaben zu CI-CD
</commit_message>
<xml_diff>
--- a/slides/Tag-2_4-CI_CD.pptx
+++ b/slides/Tag-2_4-CI_CD.pptx
@@ -6,10 +6,10 @@
     <p:sldMasterId id="2147483649" r:id="rId2"/>
   </p:sldMasterIdLst>
   <p:notesMasterIdLst>
-    <p:notesMasterId r:id="rId47"/>
+    <p:notesMasterId r:id="rId51"/>
   </p:notesMasterIdLst>
   <p:handoutMasterIdLst>
-    <p:handoutMasterId r:id="rId48"/>
+    <p:handoutMasterId r:id="rId52"/>
   </p:handoutMasterIdLst>
   <p:sldIdLst>
     <p:sldId id="623" r:id="rId3"/>
@@ -47,15 +47,19 @@
     <p:sldId id="591" r:id="rId35"/>
     <p:sldId id="607" r:id="rId36"/>
     <p:sldId id="630" r:id="rId37"/>
-    <p:sldId id="631" r:id="rId38"/>
-    <p:sldId id="632" r:id="rId39"/>
-    <p:sldId id="629" r:id="rId40"/>
-    <p:sldId id="628" r:id="rId41"/>
-    <p:sldId id="633" r:id="rId42"/>
-    <p:sldId id="617" r:id="rId43"/>
-    <p:sldId id="618" r:id="rId44"/>
-    <p:sldId id="619" r:id="rId45"/>
-    <p:sldId id="620" r:id="rId46"/>
+    <p:sldId id="638" r:id="rId38"/>
+    <p:sldId id="639" r:id="rId39"/>
+    <p:sldId id="631" r:id="rId40"/>
+    <p:sldId id="632" r:id="rId41"/>
+    <p:sldId id="640" r:id="rId42"/>
+    <p:sldId id="641" r:id="rId43"/>
+    <p:sldId id="629" r:id="rId44"/>
+    <p:sldId id="628" r:id="rId45"/>
+    <p:sldId id="633" r:id="rId46"/>
+    <p:sldId id="617" r:id="rId47"/>
+    <p:sldId id="618" r:id="rId48"/>
+    <p:sldId id="619" r:id="rId49"/>
+    <p:sldId id="620" r:id="rId50"/>
   </p:sldIdLst>
   <p:sldSz cx="9144000" cy="6858000" type="screen4x3"/>
   <p:notesSz cx="6784975" cy="9921875"/>
@@ -2430,7 +2434,7 @@
     </p:spTree>
     <p:extLst>
       <p:ext uri="{BB962C8B-B14F-4D97-AF65-F5344CB8AC3E}">
-        <p14:creationId xmlns:p14="http://schemas.microsoft.com/office/powerpoint/2010/main" val="1602802617"/>
+        <p14:creationId xmlns:p14="http://schemas.microsoft.com/office/powerpoint/2010/main" val="345997619"/>
       </p:ext>
     </p:extLst>
   </p:cSld>
@@ -2486,6 +2490,9 @@
           <a:p>
             <a:endParaRPr lang="de-DE" dirty="0"/>
           </a:p>
+          <a:p>
+            <a:endParaRPr lang="de-DE" dirty="0"/>
+          </a:p>
         </p:txBody>
       </p:sp>
       <p:sp>
@@ -2515,7 +2522,7 @@
     </p:spTree>
     <p:extLst>
       <p:ext uri="{BB962C8B-B14F-4D97-AF65-F5344CB8AC3E}">
-        <p14:creationId xmlns:p14="http://schemas.microsoft.com/office/powerpoint/2010/main" val="1060155199"/>
+        <p14:creationId xmlns:p14="http://schemas.microsoft.com/office/powerpoint/2010/main" val="3580878920"/>
       </p:ext>
     </p:extLst>
   </p:cSld>
@@ -2600,7 +2607,7 @@
     </p:spTree>
     <p:extLst>
       <p:ext uri="{BB962C8B-B14F-4D97-AF65-F5344CB8AC3E}">
-        <p14:creationId xmlns:p14="http://schemas.microsoft.com/office/powerpoint/2010/main" val="1336523162"/>
+        <p14:creationId xmlns:p14="http://schemas.microsoft.com/office/powerpoint/2010/main" val="1602802617"/>
       </p:ext>
     </p:extLst>
   </p:cSld>
@@ -2685,7 +2692,7 @@
     </p:spTree>
     <p:extLst>
       <p:ext uri="{BB962C8B-B14F-4D97-AF65-F5344CB8AC3E}">
-        <p14:creationId xmlns:p14="http://schemas.microsoft.com/office/powerpoint/2010/main" val="3776710161"/>
+        <p14:creationId xmlns:p14="http://schemas.microsoft.com/office/powerpoint/2010/main" val="1060155199"/>
       </p:ext>
     </p:extLst>
   </p:cSld>
@@ -2770,7 +2777,7 @@
     </p:spTree>
     <p:extLst>
       <p:ext uri="{BB962C8B-B14F-4D97-AF65-F5344CB8AC3E}">
-        <p14:creationId xmlns:p14="http://schemas.microsoft.com/office/powerpoint/2010/main" val="4183807495"/>
+        <p14:creationId xmlns:p14="http://schemas.microsoft.com/office/powerpoint/2010/main" val="2122505471"/>
       </p:ext>
     </p:extLst>
   </p:cSld>
@@ -2826,6 +2833,9 @@
           <a:p>
             <a:endParaRPr lang="de-DE" dirty="0"/>
           </a:p>
+          <a:p>
+            <a:endParaRPr lang="de-DE" dirty="0"/>
+          </a:p>
         </p:txBody>
       </p:sp>
       <p:sp>
@@ -2855,7 +2865,7 @@
     </p:spTree>
     <p:extLst>
       <p:ext uri="{BB962C8B-B14F-4D97-AF65-F5344CB8AC3E}">
-        <p14:creationId xmlns:p14="http://schemas.microsoft.com/office/powerpoint/2010/main" val="4030025492"/>
+        <p14:creationId xmlns:p14="http://schemas.microsoft.com/office/powerpoint/2010/main" val="1139949560"/>
       </p:ext>
     </p:extLst>
   </p:cSld>
@@ -2996,9 +3006,6 @@
           <a:p>
             <a:endParaRPr lang="de-DE" dirty="0"/>
           </a:p>
-          <a:p>
-            <a:endParaRPr lang="de-DE" dirty="0"/>
-          </a:p>
         </p:txBody>
       </p:sp>
       <p:sp>
@@ -3028,7 +3035,7 @@
     </p:spTree>
     <p:extLst>
       <p:ext uri="{BB962C8B-B14F-4D97-AF65-F5344CB8AC3E}">
-        <p14:creationId xmlns:p14="http://schemas.microsoft.com/office/powerpoint/2010/main" val="3077020303"/>
+        <p14:creationId xmlns:p14="http://schemas.microsoft.com/office/powerpoint/2010/main" val="1336523162"/>
       </p:ext>
     </p:extLst>
   </p:cSld>
@@ -3113,7 +3120,7 @@
     </p:spTree>
     <p:extLst>
       <p:ext uri="{BB962C8B-B14F-4D97-AF65-F5344CB8AC3E}">
-        <p14:creationId xmlns:p14="http://schemas.microsoft.com/office/powerpoint/2010/main" val="3979204594"/>
+        <p14:creationId xmlns:p14="http://schemas.microsoft.com/office/powerpoint/2010/main" val="3776710161"/>
       </p:ext>
     </p:extLst>
   </p:cSld>
@@ -3169,9 +3176,6 @@
           <a:p>
             <a:endParaRPr lang="de-DE" dirty="0"/>
           </a:p>
-          <a:p>
-            <a:endParaRPr lang="de-DE" dirty="0"/>
-          </a:p>
         </p:txBody>
       </p:sp>
       <p:sp>
@@ -3193,6 +3197,352 @@
               <a:rPr lang="de-DE" altLang="de-DE" smtClean="0"/>
               <a:pPr/>
               <a:t>44</a:t>
+            </a:fld>
+            <a:endParaRPr lang="de-DE" altLang="de-DE"/>
+          </a:p>
+        </p:txBody>
+      </p:sp>
+    </p:spTree>
+    <p:extLst>
+      <p:ext uri="{BB962C8B-B14F-4D97-AF65-F5344CB8AC3E}">
+        <p14:creationId xmlns:p14="http://schemas.microsoft.com/office/powerpoint/2010/main" val="4183807495"/>
+      </p:ext>
+    </p:extLst>
+  </p:cSld>
+  <p:clrMapOvr>
+    <a:masterClrMapping/>
+  </p:clrMapOvr>
+</p:notes>
+</file>
+
+<file path=ppt/notesSlides/notesSlide33.xml><?xml version="1.0" encoding="utf-8"?>
+<p:notes xmlns:a="http://schemas.openxmlformats.org/drawingml/2006/main" xmlns:r="http://schemas.openxmlformats.org/officeDocument/2006/relationships" xmlns:p="http://schemas.openxmlformats.org/presentationml/2006/main">
+  <p:cSld>
+    <p:spTree>
+      <p:nvGrpSpPr>
+        <p:cNvPr id="1" name=""/>
+        <p:cNvGrpSpPr/>
+        <p:nvPr/>
+      </p:nvGrpSpPr>
+      <p:grpSpPr>
+        <a:xfrm>
+          <a:off x="0" y="0"/>
+          <a:ext cx="0" cy="0"/>
+          <a:chOff x="0" y="0"/>
+          <a:chExt cx="0" cy="0"/>
+        </a:xfrm>
+      </p:grpSpPr>
+      <p:sp>
+        <p:nvSpPr>
+          <p:cNvPr id="2" name="Folienbildplatzhalter 1"/>
+          <p:cNvSpPr>
+            <a:spLocks noGrp="1" noRot="1" noChangeAspect="1"/>
+          </p:cNvSpPr>
+          <p:nvPr>
+            <p:ph type="sldImg"/>
+          </p:nvPr>
+        </p:nvSpPr>
+        <p:spPr/>
+      </p:sp>
+      <p:sp>
+        <p:nvSpPr>
+          <p:cNvPr id="3" name="Notizenplatzhalter 2"/>
+          <p:cNvSpPr>
+            <a:spLocks noGrp="1"/>
+          </p:cNvSpPr>
+          <p:nvPr>
+            <p:ph type="body" idx="1"/>
+          </p:nvPr>
+        </p:nvSpPr>
+        <p:spPr/>
+        <p:txBody>
+          <a:bodyPr/>
+          <a:lstStyle/>
+          <a:p>
+            <a:endParaRPr lang="de-DE" dirty="0"/>
+          </a:p>
+        </p:txBody>
+      </p:sp>
+      <p:sp>
+        <p:nvSpPr>
+          <p:cNvPr id="4" name="Foliennummernplatzhalter 3"/>
+          <p:cNvSpPr>
+            <a:spLocks noGrp="1"/>
+          </p:cNvSpPr>
+          <p:nvPr>
+            <p:ph type="sldNum" sz="quarter" idx="5"/>
+          </p:nvPr>
+        </p:nvSpPr>
+        <p:spPr/>
+        <p:txBody>
+          <a:bodyPr/>
+          <a:lstStyle/>
+          <a:p>
+            <a:fld id="{18182567-388C-4D33-8B7B-A651F195F118}" type="slidenum">
+              <a:rPr lang="de-DE" altLang="de-DE" smtClean="0"/>
+              <a:pPr/>
+              <a:t>45</a:t>
+            </a:fld>
+            <a:endParaRPr lang="de-DE" altLang="de-DE"/>
+          </a:p>
+        </p:txBody>
+      </p:sp>
+    </p:spTree>
+    <p:extLst>
+      <p:ext uri="{BB962C8B-B14F-4D97-AF65-F5344CB8AC3E}">
+        <p14:creationId xmlns:p14="http://schemas.microsoft.com/office/powerpoint/2010/main" val="4030025492"/>
+      </p:ext>
+    </p:extLst>
+  </p:cSld>
+  <p:clrMapOvr>
+    <a:masterClrMapping/>
+  </p:clrMapOvr>
+</p:notes>
+</file>
+
+<file path=ppt/notesSlides/notesSlide34.xml><?xml version="1.0" encoding="utf-8"?>
+<p:notes xmlns:a="http://schemas.openxmlformats.org/drawingml/2006/main" xmlns:r="http://schemas.openxmlformats.org/officeDocument/2006/relationships" xmlns:p="http://schemas.openxmlformats.org/presentationml/2006/main">
+  <p:cSld>
+    <p:spTree>
+      <p:nvGrpSpPr>
+        <p:cNvPr id="1" name=""/>
+        <p:cNvGrpSpPr/>
+        <p:nvPr/>
+      </p:nvGrpSpPr>
+      <p:grpSpPr>
+        <a:xfrm>
+          <a:off x="0" y="0"/>
+          <a:ext cx="0" cy="0"/>
+          <a:chOff x="0" y="0"/>
+          <a:chExt cx="0" cy="0"/>
+        </a:xfrm>
+      </p:grpSpPr>
+      <p:sp>
+        <p:nvSpPr>
+          <p:cNvPr id="2" name="Folienbildplatzhalter 1"/>
+          <p:cNvSpPr>
+            <a:spLocks noGrp="1" noRot="1" noChangeAspect="1"/>
+          </p:cNvSpPr>
+          <p:nvPr>
+            <p:ph type="sldImg"/>
+          </p:nvPr>
+        </p:nvSpPr>
+        <p:spPr/>
+      </p:sp>
+      <p:sp>
+        <p:nvSpPr>
+          <p:cNvPr id="3" name="Notizenplatzhalter 2"/>
+          <p:cNvSpPr>
+            <a:spLocks noGrp="1"/>
+          </p:cNvSpPr>
+          <p:nvPr>
+            <p:ph type="body" idx="1"/>
+          </p:nvPr>
+        </p:nvSpPr>
+        <p:spPr/>
+        <p:txBody>
+          <a:bodyPr/>
+          <a:lstStyle/>
+          <a:p>
+            <a:endParaRPr lang="de-DE" dirty="0"/>
+          </a:p>
+          <a:p>
+            <a:endParaRPr lang="de-DE" dirty="0"/>
+          </a:p>
+        </p:txBody>
+      </p:sp>
+      <p:sp>
+        <p:nvSpPr>
+          <p:cNvPr id="4" name="Foliennummernplatzhalter 3"/>
+          <p:cNvSpPr>
+            <a:spLocks noGrp="1"/>
+          </p:cNvSpPr>
+          <p:nvPr>
+            <p:ph type="sldNum" sz="quarter" idx="5"/>
+          </p:nvPr>
+        </p:nvSpPr>
+        <p:spPr/>
+        <p:txBody>
+          <a:bodyPr/>
+          <a:lstStyle/>
+          <a:p>
+            <a:fld id="{18182567-388C-4D33-8B7B-A651F195F118}" type="slidenum">
+              <a:rPr lang="de-DE" altLang="de-DE" smtClean="0"/>
+              <a:pPr/>
+              <a:t>46</a:t>
+            </a:fld>
+            <a:endParaRPr lang="de-DE" altLang="de-DE"/>
+          </a:p>
+        </p:txBody>
+      </p:sp>
+    </p:spTree>
+    <p:extLst>
+      <p:ext uri="{BB962C8B-B14F-4D97-AF65-F5344CB8AC3E}">
+        <p14:creationId xmlns:p14="http://schemas.microsoft.com/office/powerpoint/2010/main" val="3077020303"/>
+      </p:ext>
+    </p:extLst>
+  </p:cSld>
+  <p:clrMapOvr>
+    <a:masterClrMapping/>
+  </p:clrMapOvr>
+</p:notes>
+</file>
+
+<file path=ppt/notesSlides/notesSlide35.xml><?xml version="1.0" encoding="utf-8"?>
+<p:notes xmlns:a="http://schemas.openxmlformats.org/drawingml/2006/main" xmlns:r="http://schemas.openxmlformats.org/officeDocument/2006/relationships" xmlns:p="http://schemas.openxmlformats.org/presentationml/2006/main">
+  <p:cSld>
+    <p:spTree>
+      <p:nvGrpSpPr>
+        <p:cNvPr id="1" name=""/>
+        <p:cNvGrpSpPr/>
+        <p:nvPr/>
+      </p:nvGrpSpPr>
+      <p:grpSpPr>
+        <a:xfrm>
+          <a:off x="0" y="0"/>
+          <a:ext cx="0" cy="0"/>
+          <a:chOff x="0" y="0"/>
+          <a:chExt cx="0" cy="0"/>
+        </a:xfrm>
+      </p:grpSpPr>
+      <p:sp>
+        <p:nvSpPr>
+          <p:cNvPr id="2" name="Folienbildplatzhalter 1"/>
+          <p:cNvSpPr>
+            <a:spLocks noGrp="1" noRot="1" noChangeAspect="1"/>
+          </p:cNvSpPr>
+          <p:nvPr>
+            <p:ph type="sldImg"/>
+          </p:nvPr>
+        </p:nvSpPr>
+        <p:spPr/>
+      </p:sp>
+      <p:sp>
+        <p:nvSpPr>
+          <p:cNvPr id="3" name="Notizenplatzhalter 2"/>
+          <p:cNvSpPr>
+            <a:spLocks noGrp="1"/>
+          </p:cNvSpPr>
+          <p:nvPr>
+            <p:ph type="body" idx="1"/>
+          </p:nvPr>
+        </p:nvSpPr>
+        <p:spPr/>
+        <p:txBody>
+          <a:bodyPr/>
+          <a:lstStyle/>
+          <a:p>
+            <a:endParaRPr lang="de-DE" dirty="0"/>
+          </a:p>
+        </p:txBody>
+      </p:sp>
+      <p:sp>
+        <p:nvSpPr>
+          <p:cNvPr id="4" name="Foliennummernplatzhalter 3"/>
+          <p:cNvSpPr>
+            <a:spLocks noGrp="1"/>
+          </p:cNvSpPr>
+          <p:nvPr>
+            <p:ph type="sldNum" sz="quarter" idx="5"/>
+          </p:nvPr>
+        </p:nvSpPr>
+        <p:spPr/>
+        <p:txBody>
+          <a:bodyPr/>
+          <a:lstStyle/>
+          <a:p>
+            <a:fld id="{18182567-388C-4D33-8B7B-A651F195F118}" type="slidenum">
+              <a:rPr lang="de-DE" altLang="de-DE" smtClean="0"/>
+              <a:pPr/>
+              <a:t>47</a:t>
+            </a:fld>
+            <a:endParaRPr lang="de-DE" altLang="de-DE"/>
+          </a:p>
+        </p:txBody>
+      </p:sp>
+    </p:spTree>
+    <p:extLst>
+      <p:ext uri="{BB962C8B-B14F-4D97-AF65-F5344CB8AC3E}">
+        <p14:creationId xmlns:p14="http://schemas.microsoft.com/office/powerpoint/2010/main" val="3979204594"/>
+      </p:ext>
+    </p:extLst>
+  </p:cSld>
+  <p:clrMapOvr>
+    <a:masterClrMapping/>
+  </p:clrMapOvr>
+</p:notes>
+</file>
+
+<file path=ppt/notesSlides/notesSlide36.xml><?xml version="1.0" encoding="utf-8"?>
+<p:notes xmlns:a="http://schemas.openxmlformats.org/drawingml/2006/main" xmlns:r="http://schemas.openxmlformats.org/officeDocument/2006/relationships" xmlns:p="http://schemas.openxmlformats.org/presentationml/2006/main">
+  <p:cSld>
+    <p:spTree>
+      <p:nvGrpSpPr>
+        <p:cNvPr id="1" name=""/>
+        <p:cNvGrpSpPr/>
+        <p:nvPr/>
+      </p:nvGrpSpPr>
+      <p:grpSpPr>
+        <a:xfrm>
+          <a:off x="0" y="0"/>
+          <a:ext cx="0" cy="0"/>
+          <a:chOff x="0" y="0"/>
+          <a:chExt cx="0" cy="0"/>
+        </a:xfrm>
+      </p:grpSpPr>
+      <p:sp>
+        <p:nvSpPr>
+          <p:cNvPr id="2" name="Folienbildplatzhalter 1"/>
+          <p:cNvSpPr>
+            <a:spLocks noGrp="1" noRot="1" noChangeAspect="1"/>
+          </p:cNvSpPr>
+          <p:nvPr>
+            <p:ph type="sldImg"/>
+          </p:nvPr>
+        </p:nvSpPr>
+        <p:spPr/>
+      </p:sp>
+      <p:sp>
+        <p:nvSpPr>
+          <p:cNvPr id="3" name="Notizenplatzhalter 2"/>
+          <p:cNvSpPr>
+            <a:spLocks noGrp="1"/>
+          </p:cNvSpPr>
+          <p:nvPr>
+            <p:ph type="body" idx="1"/>
+          </p:nvPr>
+        </p:nvSpPr>
+        <p:spPr/>
+        <p:txBody>
+          <a:bodyPr/>
+          <a:lstStyle/>
+          <a:p>
+            <a:endParaRPr lang="de-DE" dirty="0"/>
+          </a:p>
+          <a:p>
+            <a:endParaRPr lang="de-DE" dirty="0"/>
+          </a:p>
+        </p:txBody>
+      </p:sp>
+      <p:sp>
+        <p:nvSpPr>
+          <p:cNvPr id="4" name="Foliennummernplatzhalter 3"/>
+          <p:cNvSpPr>
+            <a:spLocks noGrp="1"/>
+          </p:cNvSpPr>
+          <p:nvPr>
+            <p:ph type="sldNum" sz="quarter" idx="5"/>
+          </p:nvPr>
+        </p:nvSpPr>
+        <p:spPr/>
+        <p:txBody>
+          <a:bodyPr/>
+          <a:lstStyle/>
+          <a:p>
+            <a:fld id="{18182567-388C-4D33-8B7B-A651F195F118}" type="slidenum">
+              <a:rPr lang="de-DE" altLang="de-DE" smtClean="0"/>
+              <a:pPr/>
+              <a:t>48</a:t>
             </a:fld>
             <a:endParaRPr lang="de-DE" altLang="de-DE"/>
           </a:p>
@@ -4205,7 +4555,7 @@
               <a:pPr algn="ctr">
                 <a:defRPr/>
               </a:pPr>
-              <a:t>10.07.2024</a:t>
+              <a:t>29.07.2024</a:t>
             </a:fld>
             <a:endParaRPr lang="de-DE" sz="1000">
               <a:solidFill>
@@ -19749,7 +20099,7 @@
           <p:cNvPr id="2" name="Titel 1">
             <a:extLst>
               <a:ext uri="{FF2B5EF4-FFF2-40B4-BE49-F238E27FC236}">
-                <a16:creationId xmlns:a16="http://schemas.microsoft.com/office/drawing/2014/main" id="{3363B985-2812-BDBB-7E9D-A28D84AB06EF}"/>
+                <a16:creationId xmlns:a16="http://schemas.microsoft.com/office/drawing/2014/main" id="{74F61811-DDD3-CD36-300B-D3CAEEBD8E91}"/>
               </a:ext>
             </a:extLst>
           </p:cNvPr>
@@ -19774,10 +20124,10 @@
       </p:sp>
       <p:sp>
         <p:nvSpPr>
-          <p:cNvPr id="4" name="Inhaltsplatzhalter 2">
+          <p:cNvPr id="10" name="Inhaltsplatzhalter 2">
             <a:extLst>
               <a:ext uri="{FF2B5EF4-FFF2-40B4-BE49-F238E27FC236}">
-                <a16:creationId xmlns:a16="http://schemas.microsoft.com/office/drawing/2014/main" id="{FE26268B-C609-ACA5-B6B4-D8D23D94F991}"/>
+                <a16:creationId xmlns:a16="http://schemas.microsoft.com/office/drawing/2014/main" id="{65F4F27F-EA27-84BE-FDD1-AE4BEA6A264F}"/>
               </a:ext>
             </a:extLst>
           </p:cNvPr>
@@ -19803,46 +20153,122 @@
             </a:pPr>
             <a:r>
               <a:rPr lang="de-DE" b="1" dirty="0"/>
-              <a:t>Extension</a:t>
+              <a:t>Aufgabe 6: Einführung von Defaults</a:t>
             </a:r>
             <a:endParaRPr lang="de-DE" dirty="0"/>
+          </a:p>
+          <a:p>
+            <a:pPr marL="457200" indent="-457200">
+              <a:buAutoNum type="arabicPeriod"/>
+            </a:pPr>
+            <a:r>
+              <a:rPr lang="de-DE" b="1" dirty="0"/>
+              <a:t>Ziel</a:t>
+            </a:r>
+            <a:r>
+              <a:rPr lang="de-DE" dirty="0"/>
+              <a:t>: Lerne, </a:t>
+            </a:r>
+            <a:r>
+              <a:rPr lang="de-DE" dirty="0">
+                <a:ea typeface="+mn-lt"/>
+                <a:cs typeface="+mn-lt"/>
+              </a:rPr>
+              <a:t>wie man Defaults in </a:t>
+            </a:r>
+            <a:r>
+              <a:rPr lang="de-DE" dirty="0" err="1">
+                <a:ea typeface="+mn-lt"/>
+                <a:cs typeface="+mn-lt"/>
+              </a:rPr>
+              <a:t>GitLab</a:t>
+            </a:r>
+            <a:r>
+              <a:rPr lang="de-DE" dirty="0">
+                <a:ea typeface="+mn-lt"/>
+                <a:cs typeface="+mn-lt"/>
+              </a:rPr>
+              <a:t> CI/CD Pipelines verwenden kann, um den Aufbau des Codes zu vereinfachen und die Wartbarkeit des Codes zu verbessern.</a:t>
+            </a:r>
+            <a:endParaRPr lang="de-DE" dirty="0">
+              <a:cs typeface="Arial"/>
+            </a:endParaRPr>
+          </a:p>
+          <a:p>
+            <a:pPr marL="457200" indent="-457200">
+              <a:buFont typeface="+mj-lt"/>
+              <a:buAutoNum type="arabicPeriod"/>
+            </a:pPr>
+            <a:r>
+              <a:rPr lang="de-DE" b="1" dirty="0"/>
+              <a:t>Schritte</a:t>
+            </a:r>
+            <a:r>
+              <a:rPr lang="de-DE" dirty="0"/>
+              <a:t>:</a:t>
+            </a:r>
+          </a:p>
+          <a:p>
+            <a:pPr lvl="1">
+              <a:buFont typeface="Arial" panose="020B0604020202020204" pitchFamily="34" charset="0"/>
+              <a:buChar char="•"/>
+            </a:pPr>
+            <a:r>
+              <a:rPr lang="de-DE" dirty="0">
+                <a:cs typeface="Arial"/>
+              </a:rPr>
+              <a:t>Setze die </a:t>
+            </a:r>
+            <a:r>
+              <a:rPr lang="de-DE" dirty="0" err="1">
+                <a:cs typeface="Arial"/>
+              </a:rPr>
+              <a:t>default</a:t>
+            </a:r>
+            <a:r>
+              <a:rPr lang="de-DE" dirty="0">
+                <a:cs typeface="Arial"/>
+              </a:rPr>
+              <a:t> Stage auf "</a:t>
+            </a:r>
+            <a:r>
+              <a:rPr lang="de-DE" dirty="0" err="1">
+                <a:cs typeface="Arial"/>
+              </a:rPr>
+              <a:t>build</a:t>
+            </a:r>
+            <a:r>
+              <a:rPr lang="de-DE" dirty="0">
+                <a:cs typeface="Arial"/>
+              </a:rPr>
+              <a:t>"</a:t>
+            </a:r>
+          </a:p>
+          <a:p>
+            <a:pPr lvl="1">
+              <a:buFont typeface="Arial" panose="020B0604020202020204" pitchFamily="34" charset="0"/>
+              <a:buChar char="•"/>
+            </a:pPr>
+            <a:r>
+              <a:rPr lang="de-DE" dirty="0">
+                <a:cs typeface="Arial"/>
+              </a:rPr>
+              <a:t>Entferne die überflüssigen Stage Zuweisungen</a:t>
+            </a:r>
           </a:p>
           <a:p>
             <a:pPr>
               <a:buFont typeface="Arial" panose="020B0604020202020204" pitchFamily="34" charset="0"/>
               <a:buChar char="•"/>
             </a:pPr>
-            <a:r>
-              <a:rPr lang="de-DE" dirty="0"/>
-              <a:t>Definition wiederverwendbarer Job Templates</a:t>
-            </a:r>
-          </a:p>
-          <a:p>
-            <a:pPr>
-              <a:buFont typeface="Arial" panose="020B0604020202020204" pitchFamily="34" charset="0"/>
-              <a:buChar char="•"/>
-            </a:pPr>
-            <a:r>
-              <a:rPr lang="de-DE" dirty="0"/>
-              <a:t>Verwendung („Erweiterung“) nach Bedarf</a:t>
-            </a:r>
-          </a:p>
-          <a:p>
-            <a:pPr>
-              <a:buFont typeface="Arial" panose="020B0604020202020204" pitchFamily="34" charset="0"/>
-              <a:buChar char="•"/>
-            </a:pPr>
-            <a:r>
-              <a:rPr lang="de-DE" dirty="0"/>
-              <a:t>Überschreibung (eingeschränkt) möglich</a:t>
-            </a:r>
+            <a:endParaRPr lang="de-DE" dirty="0"/>
           </a:p>
         </p:txBody>
       </p:sp>
     </p:spTree>
     <p:extLst>
       <p:ext uri="{BB962C8B-B14F-4D97-AF65-F5344CB8AC3E}">
-        <p14:creationId xmlns:p14="http://schemas.microsoft.com/office/powerpoint/2010/main" val="3855720706"/>
+        <p14:creationId xmlns:p14="http://schemas.microsoft.com/office/powerpoint/2010/main" val="638463279"/>
       </p:ext>
     </p:extLst>
   </p:cSld>
@@ -19874,7 +20300,7 @@
           <p:cNvPr id="2" name="Titel 1">
             <a:extLst>
               <a:ext uri="{FF2B5EF4-FFF2-40B4-BE49-F238E27FC236}">
-                <a16:creationId xmlns:a16="http://schemas.microsoft.com/office/drawing/2014/main" id="{3363B985-2812-BDBB-7E9D-A28D84AB06EF}"/>
+                <a16:creationId xmlns:a16="http://schemas.microsoft.com/office/drawing/2014/main" id="{A2A2EB4E-4B87-3A94-66CB-0424D340A9D6}"/>
               </a:ext>
             </a:extLst>
           </p:cNvPr>
@@ -19899,10 +20325,10 @@
       </p:sp>
       <p:sp>
         <p:nvSpPr>
-          <p:cNvPr id="4" name="Inhaltsplatzhalter 2">
+          <p:cNvPr id="10" name="Inhaltsplatzhalter 2">
             <a:extLst>
               <a:ext uri="{FF2B5EF4-FFF2-40B4-BE49-F238E27FC236}">
-                <a16:creationId xmlns:a16="http://schemas.microsoft.com/office/drawing/2014/main" id="{FE26268B-C609-ACA5-B6B4-D8D23D94F991}"/>
+                <a16:creationId xmlns:a16="http://schemas.microsoft.com/office/drawing/2014/main" id="{F2E8AEA4-8F06-E96C-F551-3CA6B4EF1E8C}"/>
               </a:ext>
             </a:extLst>
           </p:cNvPr>
@@ -19923,22 +20349,40 @@
           <a:bodyPr/>
           <a:lstStyle/>
           <a:p>
-            <a:pPr marL="0" indent="0">
+            <a:pPr>
               <a:buNone/>
             </a:pPr>
             <a:r>
               <a:rPr lang="de-DE" b="1" dirty="0"/>
-              <a:t>Extension</a:t>
-            </a:r>
+              <a:t>Aufgabe 6: Einführung von Defaults</a:t>
+            </a:r>
+            <a:endParaRPr lang="de-DE" dirty="0"/>
+          </a:p>
+          <a:p>
+            <a:pPr>
+              <a:buFont typeface="Arial" panose="020B0604020202020204" pitchFamily="34" charset="0"/>
+              <a:buChar char="•"/>
+            </a:pPr>
+            <a:r>
+              <a:rPr lang="de-DE" dirty="0"/>
+              <a:t>Mögliche Lösung:</a:t>
+            </a:r>
+          </a:p>
+          <a:p>
+            <a:pPr lvl="1">
+              <a:buFont typeface="Arial" panose="020B0604020202020204" pitchFamily="34" charset="0"/>
+              <a:buChar char="•"/>
+            </a:pPr>
+            <a:endParaRPr lang="de-DE" dirty="0"/>
           </a:p>
         </p:txBody>
       </p:sp>
       <p:sp>
         <p:nvSpPr>
-          <p:cNvPr id="3" name="Textfeld 2">
+          <p:cNvPr id="4" name="Textfeld 3">
             <a:extLst>
               <a:ext uri="{FF2B5EF4-FFF2-40B4-BE49-F238E27FC236}">
-                <a16:creationId xmlns:a16="http://schemas.microsoft.com/office/drawing/2014/main" id="{B1300DFB-F7A0-3AE1-8D8C-2D16867CB0F9}"/>
+                <a16:creationId xmlns:a16="http://schemas.microsoft.com/office/drawing/2014/main" id="{A0516D05-F548-F56C-DF2F-B5B2036DC0D5}"/>
               </a:ext>
             </a:extLst>
           </p:cNvPr>
@@ -19947,8 +20391,8 @@
         </p:nvSpPr>
         <p:spPr bwMode="auto">
           <a:xfrm>
-            <a:off x="301898" y="1488103"/>
-            <a:ext cx="8820149" cy="4893647"/>
+            <a:off x="2195736" y="1885159"/>
+            <a:ext cx="4983111" cy="4555093"/>
           </a:xfrm>
           <a:prstGeom prst="rect">
             <a:avLst/>
@@ -19962,301 +20406,607 @@
           </a:ln>
         </p:spPr>
         <p:txBody>
-          <a:bodyPr wrap="square">
+          <a:bodyPr rot="0" spcFirstLastPara="0" vertOverflow="overflow" horzOverflow="overflow" vert="horz" wrap="square" lIns="91440" tIns="45720" rIns="91440" bIns="45720" numCol="1" spcCol="0" rtlCol="0" fromWordArt="0" anchor="ctr" anchorCtr="0" forceAA="0" compatLnSpc="1">
+            <a:prstTxWarp prst="textNoShape">
+              <a:avLst/>
+            </a:prstTxWarp>
             <a:spAutoFit/>
           </a:bodyPr>
           <a:lstStyle/>
           <a:p>
-            <a:r>
-              <a:rPr lang="en-US" b="0" dirty="0">
+            <a:pPr eaLnBrk="1" hangingPunct="1"/>
+            <a:r>
+              <a:rPr lang="en-US" sz="1000" dirty="0">
                 <a:solidFill>
                   <a:srgbClr val="800000"/>
                 </a:solidFill>
-                <a:effectLst/>
-                <a:highlight>
-                  <a:srgbClr val="FFFFFF"/>
-                </a:highlight>
-                <a:latin typeface="Consolas" panose="020B0609020204030204" pitchFamily="49" charset="0"/>
-              </a:rPr>
-              <a:t>.maven:</a:t>
-            </a:r>
-          </a:p>
-          <a:p>
-            <a:r>
-              <a:rPr lang="en-US" b="0" dirty="0">
+                <a:latin typeface="Consolas"/>
+              </a:rPr>
+              <a:t>variables</a:t>
+            </a:r>
+            <a:r>
+              <a:rPr lang="en-US" sz="1000" dirty="0">
+                <a:solidFill>
+                  <a:srgbClr val="3B3B3B"/>
+                </a:solidFill>
+                <a:latin typeface="Consolas"/>
+              </a:rPr>
+              <a:t>:</a:t>
+            </a:r>
+          </a:p>
+          <a:p>
+            <a:pPr eaLnBrk="1" hangingPunct="1"/>
+            <a:r>
+              <a:rPr lang="en-US" sz="1000" dirty="0">
                 <a:solidFill>
                   <a:srgbClr val="800000"/>
                 </a:solidFill>
-                <a:effectLst/>
-                <a:highlight>
-                  <a:srgbClr val="FFFFFF"/>
-                </a:highlight>
-                <a:latin typeface="Consolas" panose="020B0609020204030204" pitchFamily="49" charset="0"/>
-              </a:rPr>
-              <a:t>  stage: </a:t>
-            </a:r>
-            <a:r>
-              <a:rPr lang="en-US" b="0" dirty="0">
-                <a:solidFill>
-                  <a:srgbClr val="0249FC"/>
-                </a:solidFill>
-                <a:effectLst/>
-                <a:highlight>
-                  <a:srgbClr val="FFFFFF"/>
-                </a:highlight>
-                <a:latin typeface="Consolas" panose="020B0609020204030204" pitchFamily="49" charset="0"/>
+                <a:latin typeface="Consolas"/>
+              </a:rPr>
+              <a:t>  DUMMY_FILE</a:t>
+            </a:r>
+            <a:r>
+              <a:rPr lang="en-US" sz="1000" dirty="0">
+                <a:solidFill>
+                  <a:srgbClr val="3B3B3B"/>
+                </a:solidFill>
+                <a:latin typeface="Consolas"/>
+              </a:rPr>
+              <a:t>: </a:t>
+            </a:r>
+            <a:r>
+              <a:rPr lang="en-US" sz="1000" dirty="0">
+                <a:solidFill>
+                  <a:srgbClr val="A31515"/>
+                </a:solidFill>
+                <a:latin typeface="Consolas"/>
+              </a:rPr>
+              <a:t>"dummy_file.txt"</a:t>
+            </a:r>
+          </a:p>
+          <a:p>
+            <a:pPr eaLnBrk="1" hangingPunct="1"/>
+            <a:br>
+              <a:rPr lang="en-US" sz="1000" dirty="0">
+                <a:latin typeface="Consolas"/>
+              </a:rPr>
+            </a:br>
+            <a:r>
+              <a:rPr lang="en-US" sz="1000" dirty="0">
+                <a:solidFill>
+                  <a:srgbClr val="800000"/>
+                </a:solidFill>
+                <a:latin typeface="Consolas"/>
+              </a:rPr>
+              <a:t>stages</a:t>
+            </a:r>
+            <a:r>
+              <a:rPr lang="en-US" sz="1000" dirty="0">
+                <a:solidFill>
+                  <a:srgbClr val="3B3B3B"/>
+                </a:solidFill>
+                <a:latin typeface="Consolas"/>
+              </a:rPr>
+              <a:t>:</a:t>
+            </a:r>
+          </a:p>
+          <a:p>
+            <a:pPr eaLnBrk="1" hangingPunct="1"/>
+            <a:r>
+              <a:rPr lang="en-US" sz="1000" dirty="0">
+                <a:solidFill>
+                  <a:srgbClr val="3B3B3B"/>
+                </a:solidFill>
+                <a:latin typeface="Consolas"/>
+              </a:rPr>
+              <a:t>  - </a:t>
+            </a:r>
+            <a:r>
+              <a:rPr lang="en-US" sz="1000" dirty="0">
+                <a:solidFill>
+                  <a:srgbClr val="0000FF"/>
+                </a:solidFill>
+                <a:latin typeface="Consolas"/>
               </a:rPr>
               <a:t>build</a:t>
             </a:r>
           </a:p>
           <a:p>
-            <a:r>
-              <a:rPr lang="en-US" b="0" dirty="0">
+            <a:pPr eaLnBrk="1" hangingPunct="1"/>
+            <a:r>
+              <a:rPr lang="en-US" sz="1000" dirty="0">
+                <a:solidFill>
+                  <a:srgbClr val="3B3B3B"/>
+                </a:solidFill>
+                <a:latin typeface="Consolas"/>
+              </a:rPr>
+              <a:t>  - </a:t>
+            </a:r>
+            <a:r>
+              <a:rPr lang="en-US" sz="1000" dirty="0">
+                <a:solidFill>
+                  <a:srgbClr val="0000FF"/>
+                </a:solidFill>
+                <a:latin typeface="Consolas"/>
+              </a:rPr>
+              <a:t>test</a:t>
+            </a:r>
+          </a:p>
+          <a:p>
+            <a:pPr eaLnBrk="1" hangingPunct="1"/>
+            <a:r>
+              <a:rPr lang="en-US" sz="1000" dirty="0">
+                <a:solidFill>
+                  <a:srgbClr val="3B3B3B"/>
+                </a:solidFill>
+                <a:latin typeface="Consolas"/>
+              </a:rPr>
+              <a:t>  - </a:t>
+            </a:r>
+            <a:r>
+              <a:rPr lang="en-US" sz="1000" dirty="0">
+                <a:solidFill>
+                  <a:srgbClr val="0000FF"/>
+                </a:solidFill>
+                <a:latin typeface="Consolas"/>
+              </a:rPr>
+              <a:t>deploy</a:t>
+            </a:r>
+          </a:p>
+          <a:p>
+            <a:pPr eaLnBrk="1" hangingPunct="1"/>
+            <a:endParaRPr lang="en-US" sz="1000" dirty="0">
+              <a:solidFill>
+                <a:srgbClr val="0000FF"/>
+              </a:solidFill>
+              <a:latin typeface="Consolas"/>
+            </a:endParaRPr>
+          </a:p>
+          <a:p>
+            <a:pPr eaLnBrk="1" hangingPunct="1"/>
+            <a:r>
+              <a:rPr lang="en-US" sz="1000" dirty="0">
                 <a:solidFill>
                   <a:srgbClr val="800000"/>
                 </a:solidFill>
-                <a:effectLst/>
-                <a:highlight>
-                  <a:srgbClr val="FFFFFF"/>
-                </a:highlight>
-                <a:latin typeface="Consolas" panose="020B0609020204030204" pitchFamily="49" charset="0"/>
-              </a:rPr>
-              <a:t>  image: </a:t>
-            </a:r>
-            <a:r>
-              <a:rPr lang="en-US" b="0" dirty="0">
-                <a:solidFill>
-                  <a:srgbClr val="0249FC"/>
-                </a:solidFill>
-                <a:effectLst/>
-                <a:highlight>
-                  <a:srgbClr val="FFFFFF"/>
-                </a:highlight>
-                <a:latin typeface="Consolas" panose="020B0609020204030204" pitchFamily="49" charset="0"/>
-              </a:rPr>
-              <a:t>maven:3.9.8-eclipse-temurin-11</a:t>
-            </a:r>
-          </a:p>
-          <a:p>
-            <a:endParaRPr lang="en-US" b="0" dirty="0">
-              <a:solidFill>
-                <a:srgbClr val="800000"/>
-              </a:solidFill>
-              <a:effectLst/>
-              <a:highlight>
-                <a:srgbClr val="FFFFFF"/>
-              </a:highlight>
-              <a:latin typeface="Consolas" panose="020B0609020204030204" pitchFamily="49" charset="0"/>
-            </a:endParaRPr>
-          </a:p>
-          <a:p>
-            <a:r>
-              <a:rPr lang="en-US" b="0" dirty="0">
+                <a:latin typeface="Consolas"/>
+              </a:rPr>
+              <a:t>default</a:t>
+            </a:r>
+            <a:r>
+              <a:rPr lang="en-US" sz="1000" dirty="0">
+                <a:solidFill>
+                  <a:srgbClr val="3B3B3B"/>
+                </a:solidFill>
+                <a:latin typeface="Consolas"/>
+              </a:rPr>
+              <a:t>:</a:t>
+            </a:r>
+          </a:p>
+          <a:p>
+            <a:pPr eaLnBrk="1" hangingPunct="1"/>
+            <a:r>
+              <a:rPr lang="en-US" sz="1000" dirty="0">
+                <a:solidFill>
+                  <a:srgbClr val="3B3B3B"/>
+                </a:solidFill>
+                <a:latin typeface="Consolas"/>
+              </a:rPr>
+              <a:t>  </a:t>
+            </a:r>
+            <a:r>
+              <a:rPr lang="en-US" sz="1000" dirty="0">
                 <a:solidFill>
                   <a:srgbClr val="800000"/>
                 </a:solidFill>
-                <a:effectLst/>
-                <a:highlight>
-                  <a:srgbClr val="FFFFFF"/>
-                </a:highlight>
-                <a:latin typeface="Consolas" panose="020B0609020204030204" pitchFamily="49" charset="0"/>
-              </a:rPr>
-              <a:t>compile:</a:t>
-            </a:r>
-          </a:p>
-          <a:p>
-            <a:r>
-              <a:rPr lang="en-US" b="0" dirty="0">
+                <a:latin typeface="Consolas"/>
+              </a:rPr>
+              <a:t>stage</a:t>
+            </a:r>
+            <a:r>
+              <a:rPr lang="en-US" sz="1000" dirty="0">
+                <a:solidFill>
+                  <a:srgbClr val="3B3B3B"/>
+                </a:solidFill>
+                <a:latin typeface="Consolas"/>
+              </a:rPr>
+              <a:t>: </a:t>
+            </a:r>
+            <a:r>
+              <a:rPr lang="en-US" sz="1000" dirty="0">
+                <a:solidFill>
+                  <a:srgbClr val="0000FF"/>
+                </a:solidFill>
+                <a:latin typeface="Consolas"/>
+              </a:rPr>
+              <a:t>build</a:t>
+            </a:r>
+          </a:p>
+          <a:p>
+            <a:pPr eaLnBrk="1" hangingPunct="1"/>
+            <a:br>
+              <a:rPr lang="en-US" sz="1000" dirty="0">
+                <a:latin typeface="Consolas"/>
+              </a:rPr>
+            </a:br>
+            <a:r>
+              <a:rPr lang="en-US" sz="1000" dirty="0" err="1">
                 <a:solidFill>
                   <a:srgbClr val="800000"/>
                 </a:solidFill>
-                <a:effectLst/>
-                <a:highlight>
-                  <a:srgbClr val="FFFFFF"/>
-                </a:highlight>
-                <a:latin typeface="Consolas" panose="020B0609020204030204" pitchFamily="49" charset="0"/>
-              </a:rPr>
-              <a:t>  extends: </a:t>
-            </a:r>
-            <a:r>
-              <a:rPr lang="en-US" b="0" dirty="0">
-                <a:solidFill>
-                  <a:srgbClr val="0249FC"/>
-                </a:solidFill>
-                <a:effectLst/>
-                <a:highlight>
-                  <a:srgbClr val="FFFFFF"/>
-                </a:highlight>
-                <a:latin typeface="Consolas" panose="020B0609020204030204" pitchFamily="49" charset="0"/>
-              </a:rPr>
-              <a:t>.maven</a:t>
-            </a:r>
-          </a:p>
-          <a:p>
-            <a:r>
-              <a:rPr lang="en-US" b="0" dirty="0">
+                <a:latin typeface="Consolas"/>
+              </a:rPr>
+              <a:t>build_job</a:t>
+            </a:r>
+            <a:r>
+              <a:rPr lang="en-US" sz="1000" dirty="0">
+                <a:solidFill>
+                  <a:srgbClr val="3B3B3B"/>
+                </a:solidFill>
+                <a:latin typeface="Consolas"/>
+              </a:rPr>
+              <a:t>:</a:t>
+            </a:r>
+            <a:r>
+              <a:rPr lang="en-US" sz="1000" dirty="0">
                 <a:solidFill>
                   <a:srgbClr val="800000"/>
                 </a:solidFill>
-                <a:effectLst/>
-                <a:highlight>
-                  <a:srgbClr val="FFFFFF"/>
-                </a:highlight>
-                <a:latin typeface="Consolas" panose="020B0609020204030204" pitchFamily="49" charset="0"/>
-              </a:rPr>
-              <a:t>  script:</a:t>
-            </a:r>
-          </a:p>
-          <a:p>
-            <a:r>
-              <a:rPr lang="en-US" b="0" dirty="0">
+                <a:latin typeface="Consolas"/>
+              </a:rPr>
+              <a:t>  script</a:t>
+            </a:r>
+            <a:r>
+              <a:rPr lang="en-US" sz="1000" dirty="0">
+                <a:solidFill>
+                  <a:srgbClr val="3B3B3B"/>
+                </a:solidFill>
+                <a:latin typeface="Consolas"/>
+              </a:rPr>
+              <a:t>:</a:t>
+            </a:r>
+          </a:p>
+          <a:p>
+            <a:pPr eaLnBrk="1" hangingPunct="1"/>
+            <a:r>
+              <a:rPr lang="en-US" sz="1000" dirty="0">
+                <a:solidFill>
+                  <a:srgbClr val="3B3B3B"/>
+                </a:solidFill>
+                <a:latin typeface="Consolas"/>
+              </a:rPr>
+              <a:t>    - </a:t>
+            </a:r>
+            <a:r>
+              <a:rPr lang="en-US" sz="1000" dirty="0">
+                <a:solidFill>
+                  <a:srgbClr val="0000FF"/>
+                </a:solidFill>
+                <a:latin typeface="Consolas"/>
+              </a:rPr>
+              <a:t>echo "Building the project..."</a:t>
+            </a:r>
+          </a:p>
+          <a:p>
+            <a:pPr eaLnBrk="1" hangingPunct="1"/>
+            <a:r>
+              <a:rPr lang="en-US" sz="1000" dirty="0">
+                <a:solidFill>
+                  <a:srgbClr val="3B3B3B"/>
+                </a:solidFill>
+                <a:latin typeface="Consolas"/>
+              </a:rPr>
+              <a:t>    - </a:t>
+            </a:r>
+            <a:r>
+              <a:rPr lang="en-US" sz="1000" dirty="0">
+                <a:solidFill>
+                  <a:srgbClr val="0000FF"/>
+                </a:solidFill>
+                <a:latin typeface="Consolas"/>
+              </a:rPr>
+              <a:t>touch $DUMMY_FILE</a:t>
+            </a:r>
+          </a:p>
+          <a:p>
+            <a:pPr eaLnBrk="1" hangingPunct="1"/>
+            <a:r>
+              <a:rPr lang="en-US" sz="1000" dirty="0">
                 <a:solidFill>
                   <a:srgbClr val="800000"/>
                 </a:solidFill>
-                <a:effectLst/>
-                <a:highlight>
-                  <a:srgbClr val="FFFFFF"/>
-                </a:highlight>
-                <a:latin typeface="Consolas" panose="020B0609020204030204" pitchFamily="49" charset="0"/>
-              </a:rPr>
-              <a:t>    - </a:t>
-            </a:r>
-            <a:r>
-              <a:rPr lang="en-US" b="0" dirty="0" err="1">
-                <a:solidFill>
-                  <a:srgbClr val="0249FC"/>
-                </a:solidFill>
-                <a:effectLst/>
-                <a:highlight>
-                  <a:srgbClr val="FFFFFF"/>
-                </a:highlight>
-                <a:latin typeface="Consolas" panose="020B0609020204030204" pitchFamily="49" charset="0"/>
-              </a:rPr>
-              <a:t>mvn</a:t>
-            </a:r>
-            <a:r>
-              <a:rPr lang="en-US" b="0" dirty="0">
-                <a:solidFill>
-                  <a:srgbClr val="0249FC"/>
-                </a:solidFill>
-                <a:effectLst/>
-                <a:highlight>
-                  <a:srgbClr val="FFFFFF"/>
-                </a:highlight>
-                <a:latin typeface="Consolas" panose="020B0609020204030204" pitchFamily="49" charset="0"/>
-              </a:rPr>
-              <a:t> clean compile</a:t>
-            </a:r>
-          </a:p>
-          <a:p>
-            <a:endParaRPr lang="en-US" b="0" dirty="0">
-              <a:solidFill>
-                <a:srgbClr val="800000"/>
-              </a:solidFill>
-              <a:effectLst/>
-              <a:highlight>
-                <a:srgbClr val="FFFFFF"/>
-              </a:highlight>
-              <a:latin typeface="Consolas" panose="020B0609020204030204" pitchFamily="49" charset="0"/>
-            </a:endParaRPr>
-          </a:p>
-          <a:p>
-            <a:r>
-              <a:rPr lang="en-US" b="0" dirty="0">
+                <a:latin typeface="Consolas"/>
+              </a:rPr>
+              <a:t>artifacts</a:t>
+            </a:r>
+            <a:r>
+              <a:rPr lang="en-US" sz="1000" dirty="0">
+                <a:solidFill>
+                  <a:srgbClr val="3B3B3B"/>
+                </a:solidFill>
+                <a:latin typeface="Consolas"/>
+              </a:rPr>
+              <a:t>:</a:t>
+            </a:r>
+          </a:p>
+          <a:p>
+            <a:pPr eaLnBrk="1" hangingPunct="1"/>
+            <a:r>
+              <a:rPr lang="en-US" sz="1000" dirty="0">
                 <a:solidFill>
                   <a:srgbClr val="800000"/>
                 </a:solidFill>
-                <a:effectLst/>
-                <a:highlight>
-                  <a:srgbClr val="FFFFFF"/>
-                </a:highlight>
-                <a:latin typeface="Consolas" panose="020B0609020204030204" pitchFamily="49" charset="0"/>
-              </a:rPr>
-              <a:t>test:</a:t>
-            </a:r>
-          </a:p>
-          <a:p>
-            <a:r>
-              <a:rPr lang="en-US" b="0" dirty="0">
+                <a:latin typeface="Consolas"/>
+              </a:rPr>
+              <a:t>  paths</a:t>
+            </a:r>
+            <a:r>
+              <a:rPr lang="en-US" sz="1000" dirty="0">
+                <a:solidFill>
+                  <a:srgbClr val="3B3B3B"/>
+                </a:solidFill>
+                <a:latin typeface="Consolas"/>
+              </a:rPr>
+              <a:t>:</a:t>
+            </a:r>
+          </a:p>
+          <a:p>
+            <a:pPr eaLnBrk="1" hangingPunct="1"/>
+            <a:r>
+              <a:rPr lang="en-US" sz="1000" dirty="0">
+                <a:solidFill>
+                  <a:srgbClr val="3B3B3B"/>
+                </a:solidFill>
+                <a:latin typeface="Consolas"/>
+              </a:rPr>
+              <a:t>    - </a:t>
+            </a:r>
+            <a:r>
+              <a:rPr lang="en-US" sz="1000" dirty="0">
+                <a:solidFill>
+                  <a:srgbClr val="0000FF"/>
+                </a:solidFill>
+                <a:latin typeface="Consolas"/>
+              </a:rPr>
+              <a:t>$DUMMY_FILE</a:t>
+            </a:r>
+          </a:p>
+          <a:p>
+            <a:pPr eaLnBrk="1" hangingPunct="1"/>
+            <a:br>
+              <a:rPr lang="en-US" sz="1000" dirty="0">
+                <a:latin typeface="Consolas"/>
+              </a:rPr>
+            </a:br>
+            <a:r>
+              <a:rPr lang="en-US" sz="1000" dirty="0" err="1">
                 <a:solidFill>
                   <a:srgbClr val="800000"/>
                 </a:solidFill>
-                <a:effectLst/>
-                <a:highlight>
-                  <a:srgbClr val="FFFFFF"/>
-                </a:highlight>
-                <a:latin typeface="Consolas" panose="020B0609020204030204" pitchFamily="49" charset="0"/>
-              </a:rPr>
-              <a:t>  extends: </a:t>
-            </a:r>
-            <a:r>
-              <a:rPr lang="en-US" b="0" dirty="0">
-                <a:solidFill>
-                  <a:srgbClr val="0249FC"/>
-                </a:solidFill>
-                <a:effectLst/>
-                <a:highlight>
-                  <a:srgbClr val="FFFFFF"/>
-                </a:highlight>
-                <a:latin typeface="Consolas" panose="020B0609020204030204" pitchFamily="49" charset="0"/>
-              </a:rPr>
-              <a:t>.maven</a:t>
-            </a:r>
-          </a:p>
-          <a:p>
-            <a:r>
-              <a:rPr lang="en-US" b="0" dirty="0">
+                <a:latin typeface="Consolas"/>
+              </a:rPr>
+              <a:t>test_job</a:t>
+            </a:r>
+            <a:r>
+              <a:rPr lang="en-US" sz="1000" dirty="0">
+                <a:solidFill>
+                  <a:srgbClr val="3B3B3B"/>
+                </a:solidFill>
+                <a:latin typeface="Consolas"/>
+              </a:rPr>
+              <a:t>:</a:t>
+            </a:r>
+          </a:p>
+          <a:p>
+            <a:pPr eaLnBrk="1" hangingPunct="1"/>
+            <a:r>
+              <a:rPr lang="en-US" sz="1000" dirty="0">
                 <a:solidFill>
                   <a:srgbClr val="800000"/>
                 </a:solidFill>
-                <a:effectLst/>
-                <a:highlight>
-                  <a:srgbClr val="FFFFFF"/>
-                </a:highlight>
-                <a:latin typeface="Consolas" panose="020B0609020204030204" pitchFamily="49" charset="0"/>
-              </a:rPr>
-              <a:t>  script:</a:t>
-            </a:r>
-          </a:p>
-          <a:p>
-            <a:r>
-              <a:rPr lang="en-US" b="0" dirty="0">
+                <a:latin typeface="Consolas"/>
+              </a:rPr>
+              <a:t>  stage</a:t>
+            </a:r>
+            <a:r>
+              <a:rPr lang="en-US" sz="1000" dirty="0">
+                <a:solidFill>
+                  <a:srgbClr val="3B3B3B"/>
+                </a:solidFill>
+                <a:latin typeface="Consolas"/>
+              </a:rPr>
+              <a:t>: </a:t>
+            </a:r>
+            <a:r>
+              <a:rPr lang="en-US" sz="1000" dirty="0">
+                <a:solidFill>
+                  <a:srgbClr val="0000FF"/>
+                </a:solidFill>
+                <a:latin typeface="Consolas"/>
+              </a:rPr>
+              <a:t>test</a:t>
+            </a:r>
+          </a:p>
+          <a:p>
+            <a:pPr eaLnBrk="1" hangingPunct="1"/>
+            <a:r>
+              <a:rPr lang="en-US" sz="1000" dirty="0">
                 <a:solidFill>
                   <a:srgbClr val="800000"/>
                 </a:solidFill>
-                <a:effectLst/>
-                <a:highlight>
-                  <a:srgbClr val="FFFFFF"/>
-                </a:highlight>
-                <a:latin typeface="Consolas" panose="020B0609020204030204" pitchFamily="49" charset="0"/>
-              </a:rPr>
-              <a:t>    - </a:t>
-            </a:r>
-            <a:r>
-              <a:rPr lang="en-US" b="0" dirty="0" err="1">
-                <a:solidFill>
-                  <a:srgbClr val="0249FC"/>
-                </a:solidFill>
-                <a:effectLst/>
-                <a:highlight>
-                  <a:srgbClr val="FFFFFF"/>
-                </a:highlight>
-                <a:latin typeface="Consolas" panose="020B0609020204030204" pitchFamily="49" charset="0"/>
-              </a:rPr>
-              <a:t>mvn</a:t>
-            </a:r>
-            <a:r>
-              <a:rPr lang="en-US" b="0" dirty="0">
-                <a:solidFill>
-                  <a:srgbClr val="0249FC"/>
-                </a:solidFill>
-                <a:effectLst/>
-                <a:highlight>
-                  <a:srgbClr val="FFFFFF"/>
-                </a:highlight>
-                <a:latin typeface="Consolas" panose="020B0609020204030204" pitchFamily="49" charset="0"/>
-              </a:rPr>
-              <a:t> verify</a:t>
+                <a:latin typeface="Consolas"/>
+              </a:rPr>
+              <a:t>  script</a:t>
+            </a:r>
+            <a:r>
+              <a:rPr lang="en-US" sz="1000" dirty="0">
+                <a:solidFill>
+                  <a:srgbClr val="3B3B3B"/>
+                </a:solidFill>
+                <a:latin typeface="Consolas"/>
+              </a:rPr>
+              <a:t>:</a:t>
+            </a:r>
+          </a:p>
+          <a:p>
+            <a:pPr eaLnBrk="1" hangingPunct="1"/>
+            <a:r>
+              <a:rPr lang="en-US" sz="1000" dirty="0">
+                <a:solidFill>
+                  <a:srgbClr val="3B3B3B"/>
+                </a:solidFill>
+                <a:latin typeface="Consolas"/>
+              </a:rPr>
+              <a:t>    - </a:t>
+            </a:r>
+            <a:r>
+              <a:rPr lang="en-US" sz="1000" dirty="0">
+                <a:solidFill>
+                  <a:srgbClr val="0000FF"/>
+                </a:solidFill>
+                <a:latin typeface="Consolas"/>
+              </a:rPr>
+              <a:t>echo "Testing the project..."</a:t>
+            </a:r>
+          </a:p>
+          <a:p>
+            <a:pPr eaLnBrk="1" hangingPunct="1"/>
+            <a:r>
+              <a:rPr lang="en-US" sz="1000" dirty="0">
+                <a:solidFill>
+                  <a:srgbClr val="3B3B3B"/>
+                </a:solidFill>
+                <a:latin typeface="Consolas"/>
+              </a:rPr>
+              <a:t>    - </a:t>
+            </a:r>
+            <a:r>
+              <a:rPr lang="en-US" sz="1000" dirty="0">
+                <a:solidFill>
+                  <a:srgbClr val="0000FF"/>
+                </a:solidFill>
+                <a:latin typeface="Consolas"/>
+              </a:rPr>
+              <a:t>ls -l $DUMMY_FILE</a:t>
+            </a:r>
+          </a:p>
+          <a:p>
+            <a:pPr eaLnBrk="1" hangingPunct="1"/>
+            <a:br>
+              <a:rPr lang="en-US" sz="1000" dirty="0">
+                <a:latin typeface="Consolas"/>
+              </a:rPr>
+            </a:br>
+            <a:r>
+              <a:rPr lang="en-US" sz="1000" dirty="0" err="1">
+                <a:solidFill>
+                  <a:srgbClr val="800000"/>
+                </a:solidFill>
+                <a:latin typeface="Consolas"/>
+              </a:rPr>
+              <a:t>deploy_job</a:t>
+            </a:r>
+            <a:r>
+              <a:rPr lang="en-US" sz="1000" dirty="0">
+                <a:solidFill>
+                  <a:srgbClr val="3B3B3B"/>
+                </a:solidFill>
+                <a:latin typeface="Consolas"/>
+              </a:rPr>
+              <a:t>:</a:t>
+            </a:r>
+          </a:p>
+          <a:p>
+            <a:pPr eaLnBrk="1" hangingPunct="1"/>
+            <a:r>
+              <a:rPr lang="en-US" sz="1000" dirty="0">
+                <a:solidFill>
+                  <a:srgbClr val="800000"/>
+                </a:solidFill>
+                <a:latin typeface="Consolas"/>
+              </a:rPr>
+              <a:t>  stage</a:t>
+            </a:r>
+            <a:r>
+              <a:rPr lang="en-US" sz="1000" dirty="0">
+                <a:solidFill>
+                  <a:srgbClr val="3B3B3B"/>
+                </a:solidFill>
+                <a:latin typeface="Consolas"/>
+              </a:rPr>
+              <a:t>: </a:t>
+            </a:r>
+            <a:r>
+              <a:rPr lang="en-US" sz="1000" dirty="0">
+                <a:solidFill>
+                  <a:srgbClr val="0000FF"/>
+                </a:solidFill>
+                <a:latin typeface="Consolas"/>
+              </a:rPr>
+              <a:t>deploy</a:t>
+            </a:r>
+          </a:p>
+          <a:p>
+            <a:pPr eaLnBrk="1" hangingPunct="1"/>
+            <a:r>
+              <a:rPr lang="en-US" sz="1000" dirty="0">
+                <a:solidFill>
+                  <a:srgbClr val="800000"/>
+                </a:solidFill>
+                <a:latin typeface="Consolas"/>
+              </a:rPr>
+              <a:t>  script</a:t>
+            </a:r>
+            <a:r>
+              <a:rPr lang="en-US" sz="1000" dirty="0">
+                <a:solidFill>
+                  <a:srgbClr val="3B3B3B"/>
+                </a:solidFill>
+                <a:latin typeface="Consolas"/>
+              </a:rPr>
+              <a:t>:</a:t>
+            </a:r>
+          </a:p>
+          <a:p>
+            <a:pPr eaLnBrk="1" hangingPunct="1"/>
+            <a:r>
+              <a:rPr lang="en-US" sz="1000" dirty="0">
+                <a:solidFill>
+                  <a:srgbClr val="3B3B3B"/>
+                </a:solidFill>
+                <a:latin typeface="Consolas"/>
+              </a:rPr>
+              <a:t>    - </a:t>
+            </a:r>
+            <a:r>
+              <a:rPr lang="en-US" sz="1000" dirty="0">
+                <a:solidFill>
+                  <a:srgbClr val="0000FF"/>
+                </a:solidFill>
+                <a:latin typeface="Consolas"/>
+              </a:rPr>
+              <a:t>echo "Deploying the project..."</a:t>
+            </a:r>
+          </a:p>
+          <a:p>
+            <a:pPr eaLnBrk="1" hangingPunct="1"/>
+            <a:r>
+              <a:rPr lang="en-US" sz="1000" dirty="0">
+                <a:solidFill>
+                  <a:srgbClr val="3B3B3B"/>
+                </a:solidFill>
+                <a:latin typeface="Consolas"/>
+              </a:rPr>
+              <a:t>    - </a:t>
+            </a:r>
+            <a:r>
+              <a:rPr lang="en-US" sz="1000" dirty="0">
+                <a:solidFill>
+                  <a:srgbClr val="0000FF"/>
+                </a:solidFill>
+                <a:latin typeface="Consolas"/>
+              </a:rPr>
+              <a:t>ls -l $DUMMY_FILE</a:t>
             </a:r>
           </a:p>
         </p:txBody>
@@ -20264,7 +21014,7 @@
     </p:spTree>
     <p:extLst>
       <p:ext uri="{BB962C8B-B14F-4D97-AF65-F5344CB8AC3E}">
-        <p14:creationId xmlns:p14="http://schemas.microsoft.com/office/powerpoint/2010/main" val="3798667439"/>
+        <p14:creationId xmlns:p14="http://schemas.microsoft.com/office/powerpoint/2010/main" val="1916387411"/>
       </p:ext>
     </p:extLst>
   </p:cSld>
@@ -20350,8 +21100,9 @@
             </a:pPr>
             <a:r>
               <a:rPr lang="de-DE" b="1" dirty="0"/>
-              <a:t>Includes</a:t>
-            </a:r>
+              <a:t>Extension</a:t>
+            </a:r>
+            <a:endParaRPr lang="de-DE" dirty="0"/>
           </a:p>
           <a:p>
             <a:pPr>
@@ -20360,7 +21111,7 @@
             </a:pPr>
             <a:r>
               <a:rPr lang="de-DE" dirty="0"/>
-              <a:t>Wiederverwendung von Variablen, Jobs, Job Templates, Defaults und ganzer Pipelines</a:t>
+              <a:t>Definition wiederverwendbarer Job Templates</a:t>
             </a:r>
           </a:p>
           <a:p>
@@ -20370,7 +21121,7 @@
             </a:pPr>
             <a:r>
               <a:rPr lang="de-DE" dirty="0"/>
-              <a:t>Über Projektgrenzen hinweg nutzbar</a:t>
+              <a:t>Verwendung („Erweiterung“) nach Bedarf</a:t>
             </a:r>
           </a:p>
           <a:p>
@@ -20380,360 +21131,7 @@
             </a:pPr>
             <a:r>
               <a:rPr lang="de-DE" dirty="0"/>
-              <a:t>Beispiel:</a:t>
-            </a:r>
-          </a:p>
-          <a:p>
-            <a:pPr>
-              <a:buFont typeface="Arial" panose="020B0604020202020204" pitchFamily="34" charset="0"/>
-              <a:buChar char="•"/>
-            </a:pPr>
-            <a:endParaRPr lang="de-DE" dirty="0"/>
-          </a:p>
-        </p:txBody>
-      </p:sp>
-      <p:sp>
-        <p:nvSpPr>
-          <p:cNvPr id="3" name="Textfeld 2">
-            <a:extLst>
-              <a:ext uri="{FF2B5EF4-FFF2-40B4-BE49-F238E27FC236}">
-                <a16:creationId xmlns:a16="http://schemas.microsoft.com/office/drawing/2014/main" id="{B1300DFB-F7A0-3AE1-8D8C-2D16867CB0F9}"/>
-              </a:ext>
-            </a:extLst>
-          </p:cNvPr>
-          <p:cNvSpPr txBox="1"/>
-          <p:nvPr/>
-        </p:nvSpPr>
-        <p:spPr bwMode="auto">
-          <a:xfrm>
-            <a:off x="323851" y="3356992"/>
-            <a:ext cx="8820149" cy="2308324"/>
-          </a:xfrm>
-          <a:prstGeom prst="rect">
-            <a:avLst/>
-          </a:prstGeom>
-          <a:noFill/>
-          <a:ln w="9525">
-            <a:noFill/>
-            <a:miter lim="800000"/>
-            <a:headEnd/>
-            <a:tailEnd/>
-          </a:ln>
-        </p:spPr>
-        <p:txBody>
-          <a:bodyPr wrap="square">
-            <a:spAutoFit/>
-          </a:bodyPr>
-          <a:lstStyle/>
-          <a:p>
-            <a:r>
-              <a:rPr lang="en-US" b="0" dirty="0">
-                <a:solidFill>
-                  <a:srgbClr val="800000"/>
-                </a:solidFill>
-                <a:effectLst/>
-                <a:highlight>
-                  <a:srgbClr val="FFFFFF"/>
-                </a:highlight>
-                <a:latin typeface="Consolas" panose="020B0609020204030204" pitchFamily="49" charset="0"/>
-              </a:rPr>
-              <a:t>include:</a:t>
-            </a:r>
-          </a:p>
-          <a:p>
-            <a:r>
-              <a:rPr lang="en-US" b="0" dirty="0">
-                <a:solidFill>
-                  <a:srgbClr val="800000"/>
-                </a:solidFill>
-                <a:effectLst/>
-                <a:highlight>
-                  <a:srgbClr val="FFFFFF"/>
-                </a:highlight>
-                <a:latin typeface="Consolas" panose="020B0609020204030204" pitchFamily="49" charset="0"/>
-              </a:rPr>
-              <a:t>  - </a:t>
-            </a:r>
-            <a:r>
-              <a:rPr lang="en-US" b="0" dirty="0">
-                <a:solidFill>
-                  <a:srgbClr val="0249FC"/>
-                </a:solidFill>
-                <a:effectLst/>
-                <a:highlight>
-                  <a:srgbClr val="FFFFFF"/>
-                </a:highlight>
-                <a:latin typeface="Consolas" panose="020B0609020204030204" pitchFamily="49" charset="0"/>
-              </a:rPr>
-              <a:t>'https://gitlab.com/</a:t>
-            </a:r>
-            <a:r>
-              <a:rPr lang="en-US" b="0" dirty="0" err="1">
-                <a:solidFill>
-                  <a:srgbClr val="0249FC"/>
-                </a:solidFill>
-                <a:effectLst/>
-                <a:highlight>
-                  <a:srgbClr val="FFFFFF"/>
-                </a:highlight>
-                <a:latin typeface="Consolas" panose="020B0609020204030204" pitchFamily="49" charset="0"/>
-              </a:rPr>
-              <a:t>myproj</a:t>
-            </a:r>
-            <a:r>
-              <a:rPr lang="en-US" b="0" dirty="0">
-                <a:solidFill>
-                  <a:srgbClr val="0249FC"/>
-                </a:solidFill>
-                <a:effectLst/>
-                <a:highlight>
-                  <a:srgbClr val="FFFFFF"/>
-                </a:highlight>
-                <a:latin typeface="Consolas" panose="020B0609020204030204" pitchFamily="49" charset="0"/>
-              </a:rPr>
-              <a:t>/raw/main/.</a:t>
-            </a:r>
-            <a:r>
-              <a:rPr lang="en-US" b="0" dirty="0" err="1">
-                <a:solidFill>
-                  <a:srgbClr val="0249FC"/>
-                </a:solidFill>
-                <a:effectLst/>
-                <a:highlight>
-                  <a:srgbClr val="FFFFFF"/>
-                </a:highlight>
-                <a:latin typeface="Consolas" panose="020B0609020204030204" pitchFamily="49" charset="0"/>
-              </a:rPr>
-              <a:t>tpl.yml</a:t>
-            </a:r>
-            <a:r>
-              <a:rPr lang="en-US" b="0" dirty="0">
-                <a:solidFill>
-                  <a:srgbClr val="0249FC"/>
-                </a:solidFill>
-                <a:effectLst/>
-                <a:highlight>
-                  <a:srgbClr val="FFFFFF"/>
-                </a:highlight>
-                <a:latin typeface="Consolas" panose="020B0609020204030204" pitchFamily="49" charset="0"/>
-              </a:rPr>
-              <a:t>'</a:t>
-            </a:r>
-          </a:p>
-          <a:p>
-            <a:r>
-              <a:rPr lang="en-US" b="0" dirty="0">
-                <a:solidFill>
-                  <a:srgbClr val="800000"/>
-                </a:solidFill>
-                <a:effectLst/>
-                <a:highlight>
-                  <a:srgbClr val="FFFFFF"/>
-                </a:highlight>
-                <a:latin typeface="Consolas" panose="020B0609020204030204" pitchFamily="49" charset="0"/>
-              </a:rPr>
-              <a:t>  - </a:t>
-            </a:r>
-            <a:r>
-              <a:rPr lang="en-US" b="0" dirty="0">
-                <a:solidFill>
-                  <a:srgbClr val="0249FC"/>
-                </a:solidFill>
-                <a:effectLst/>
-                <a:highlight>
-                  <a:srgbClr val="FFFFFF"/>
-                </a:highlight>
-                <a:latin typeface="Consolas" panose="020B0609020204030204" pitchFamily="49" charset="0"/>
-              </a:rPr>
-              <a:t>'templates/.before-</a:t>
-            </a:r>
-            <a:r>
-              <a:rPr lang="en-US" b="0" dirty="0" err="1">
-                <a:solidFill>
-                  <a:srgbClr val="0249FC"/>
-                </a:solidFill>
-                <a:effectLst/>
-                <a:highlight>
-                  <a:srgbClr val="FFFFFF"/>
-                </a:highlight>
-                <a:latin typeface="Consolas" panose="020B0609020204030204" pitchFamily="49" charset="0"/>
-              </a:rPr>
-              <a:t>script.yml</a:t>
-            </a:r>
-            <a:r>
-              <a:rPr lang="en-US" b="0" dirty="0">
-                <a:solidFill>
-                  <a:srgbClr val="0249FC"/>
-                </a:solidFill>
-                <a:effectLst/>
-                <a:highlight>
-                  <a:srgbClr val="FFFFFF"/>
-                </a:highlight>
-                <a:latin typeface="Consolas" panose="020B0609020204030204" pitchFamily="49" charset="0"/>
-              </a:rPr>
-              <a:t>'</a:t>
-            </a:r>
-          </a:p>
-          <a:p>
-            <a:r>
-              <a:rPr lang="en-US" b="0" dirty="0">
-                <a:solidFill>
-                  <a:srgbClr val="800000"/>
-                </a:solidFill>
-                <a:effectLst/>
-                <a:highlight>
-                  <a:srgbClr val="FFFFFF"/>
-                </a:highlight>
-                <a:latin typeface="Consolas" panose="020B0609020204030204" pitchFamily="49" charset="0"/>
-              </a:rPr>
-              <a:t>  - project: </a:t>
-            </a:r>
-            <a:r>
-              <a:rPr lang="en-US" b="0" dirty="0">
-                <a:solidFill>
-                  <a:srgbClr val="0249FC"/>
-                </a:solidFill>
-                <a:effectLst/>
-                <a:highlight>
-                  <a:srgbClr val="FFFFFF"/>
-                </a:highlight>
-                <a:latin typeface="Consolas" panose="020B0609020204030204" pitchFamily="49" charset="0"/>
-              </a:rPr>
-              <a:t>'</a:t>
-            </a:r>
-            <a:r>
-              <a:rPr lang="en-US" b="0" dirty="0" err="1">
-                <a:solidFill>
-                  <a:srgbClr val="0249FC"/>
-                </a:solidFill>
-                <a:effectLst/>
-                <a:highlight>
-                  <a:srgbClr val="FFFFFF"/>
-                </a:highlight>
-                <a:latin typeface="Consolas" panose="020B0609020204030204" pitchFamily="49" charset="0"/>
-              </a:rPr>
-              <a:t>pipepline</a:t>
-            </a:r>
-            <a:r>
-              <a:rPr lang="en-US" b="0" dirty="0">
-                <a:solidFill>
-                  <a:srgbClr val="0249FC"/>
-                </a:solidFill>
-                <a:effectLst/>
-                <a:highlight>
-                  <a:srgbClr val="FFFFFF"/>
-                </a:highlight>
-                <a:latin typeface="Consolas" panose="020B0609020204030204" pitchFamily="49" charset="0"/>
-              </a:rPr>
-              <a:t>-tools/</a:t>
-            </a:r>
-            <a:r>
-              <a:rPr lang="en-US" b="0" dirty="0" err="1">
-                <a:solidFill>
-                  <a:srgbClr val="0249FC"/>
-                </a:solidFill>
-                <a:effectLst/>
-                <a:highlight>
-                  <a:srgbClr val="FFFFFF"/>
-                </a:highlight>
-                <a:latin typeface="Consolas" panose="020B0609020204030204" pitchFamily="49" charset="0"/>
-              </a:rPr>
-              <a:t>gitlab</a:t>
-            </a:r>
-            <a:r>
-              <a:rPr lang="en-US" b="0" dirty="0">
-                <a:solidFill>
-                  <a:srgbClr val="0249FC"/>
-                </a:solidFill>
-                <a:effectLst/>
-                <a:highlight>
-                  <a:srgbClr val="FFFFFF"/>
-                </a:highlight>
-                <a:latin typeface="Consolas" panose="020B0609020204030204" pitchFamily="49" charset="0"/>
-              </a:rPr>
-              <a:t>-ci-includes'</a:t>
-            </a:r>
-          </a:p>
-          <a:p>
-            <a:r>
-              <a:rPr lang="en-US" b="0" dirty="0">
-                <a:solidFill>
-                  <a:srgbClr val="800000"/>
-                </a:solidFill>
-                <a:effectLst/>
-                <a:highlight>
-                  <a:srgbClr val="FFFFFF"/>
-                </a:highlight>
-                <a:latin typeface="Consolas" panose="020B0609020204030204" pitchFamily="49" charset="0"/>
-              </a:rPr>
-              <a:t>    ref: </a:t>
-            </a:r>
-            <a:r>
-              <a:rPr lang="en-US" b="0" dirty="0">
-                <a:solidFill>
-                  <a:srgbClr val="0249FC"/>
-                </a:solidFill>
-                <a:effectLst/>
-                <a:highlight>
-                  <a:srgbClr val="FFFFFF"/>
-                </a:highlight>
-                <a:latin typeface="Consolas" panose="020B0609020204030204" pitchFamily="49" charset="0"/>
-              </a:rPr>
-              <a:t>main</a:t>
-            </a:r>
-          </a:p>
-          <a:p>
-            <a:r>
-              <a:rPr lang="en-US" b="0" dirty="0">
-                <a:solidFill>
-                  <a:srgbClr val="800000"/>
-                </a:solidFill>
-                <a:effectLst/>
-                <a:highlight>
-                  <a:srgbClr val="FFFFFF"/>
-                </a:highlight>
-                <a:latin typeface="Consolas" panose="020B0609020204030204" pitchFamily="49" charset="0"/>
-              </a:rPr>
-              <a:t>    file: </a:t>
-            </a:r>
-            <a:r>
-              <a:rPr lang="en-US" b="0" dirty="0">
-                <a:solidFill>
-                  <a:srgbClr val="0249FC"/>
-                </a:solidFill>
-                <a:effectLst/>
-                <a:highlight>
-                  <a:srgbClr val="FFFFFF"/>
-                </a:highlight>
-                <a:latin typeface="Consolas" panose="020B0609020204030204" pitchFamily="49" charset="0"/>
-              </a:rPr>
-              <a:t>'templates/.ci-</a:t>
-            </a:r>
-            <a:r>
-              <a:rPr lang="en-US" b="0" dirty="0" err="1">
-                <a:solidFill>
-                  <a:srgbClr val="0249FC"/>
-                </a:solidFill>
-                <a:effectLst/>
-                <a:highlight>
-                  <a:srgbClr val="FFFFFF"/>
-                </a:highlight>
-                <a:latin typeface="Consolas" panose="020B0609020204030204" pitchFamily="49" charset="0"/>
-              </a:rPr>
-              <a:t>build.yml</a:t>
-            </a:r>
-            <a:r>
-              <a:rPr lang="en-US" b="0" dirty="0">
-                <a:solidFill>
-                  <a:srgbClr val="0249FC"/>
-                </a:solidFill>
-                <a:effectLst/>
-                <a:highlight>
-                  <a:srgbClr val="FFFFFF"/>
-                </a:highlight>
-                <a:latin typeface="Consolas" panose="020B0609020204030204" pitchFamily="49" charset="0"/>
-              </a:rPr>
-              <a:t>'</a:t>
+              <a:t>Überschreibung (eingeschränkt) möglich</a:t>
             </a:r>
           </a:p>
         </p:txBody>
@@ -20741,7 +21139,7 @@
     </p:spTree>
     <p:extLst>
       <p:ext uri="{BB962C8B-B14F-4D97-AF65-F5344CB8AC3E}">
-        <p14:creationId xmlns:p14="http://schemas.microsoft.com/office/powerpoint/2010/main" val="287164425"/>
+        <p14:creationId xmlns:p14="http://schemas.microsoft.com/office/powerpoint/2010/main" val="3855720706"/>
       </p:ext>
     </p:extLst>
   </p:cSld>
@@ -20826,74 +21224,344 @@
               <a:buNone/>
             </a:pPr>
             <a:r>
-              <a:rPr lang="de-DE" b="1" dirty="0" err="1"/>
-              <a:t>Scheduled</a:t>
-            </a:r>
-            <a:r>
               <a:rPr lang="de-DE" b="1" dirty="0"/>
-              <a:t> Pipelines</a:t>
-            </a:r>
-            <a:endParaRPr lang="de-DE" dirty="0"/>
-          </a:p>
-          <a:p>
-            <a:pPr>
-              <a:buFont typeface="Arial" panose="020B0604020202020204" pitchFamily="34" charset="0"/>
-              <a:buChar char="•"/>
-            </a:pPr>
-            <a:r>
-              <a:rPr lang="de-DE" dirty="0"/>
-              <a:t>Automatische Ausführung zu vorgegebenen Zeiten</a:t>
-            </a:r>
-          </a:p>
-          <a:p>
-            <a:pPr>
-              <a:buFont typeface="Arial" panose="020B0604020202020204" pitchFamily="34" charset="0"/>
-              <a:buChar char="•"/>
-            </a:pPr>
-            <a:r>
-              <a:rPr lang="de-DE" dirty="0"/>
-              <a:t>Manuelles Anstoßen ebenfalls möglich</a:t>
-            </a:r>
-          </a:p>
-          <a:p>
-            <a:pPr>
-              <a:buFont typeface="Arial" panose="020B0604020202020204" pitchFamily="34" charset="0"/>
-              <a:buChar char="•"/>
-            </a:pPr>
-            <a:r>
-              <a:rPr lang="de-DE" dirty="0"/>
-              <a:t>Konfiguration über </a:t>
-            </a:r>
-            <a:r>
-              <a:rPr lang="de-DE" dirty="0" err="1"/>
-              <a:t>GitLab</a:t>
-            </a:r>
-            <a:r>
-              <a:rPr lang="de-DE" dirty="0"/>
-              <a:t> GUI (erfordert </a:t>
-            </a:r>
-            <a:r>
-              <a:rPr lang="de-DE" dirty="0" err="1"/>
-              <a:t>Owner</a:t>
-            </a:r>
-            <a:r>
-              <a:rPr lang="de-DE" dirty="0"/>
-              <a:t>-Rechte)</a:t>
-            </a:r>
-          </a:p>
-          <a:p>
-            <a:pPr>
-              <a:buFont typeface="Arial" panose="020B0604020202020204" pitchFamily="34" charset="0"/>
-              <a:buChar char="•"/>
-            </a:pPr>
-            <a:endParaRPr lang="de-DE" dirty="0"/>
+              <a:t>Extension</a:t>
+            </a:r>
+          </a:p>
+        </p:txBody>
+      </p:sp>
+      <p:sp>
+        <p:nvSpPr>
+          <p:cNvPr id="3" name="Textfeld 2">
+            <a:extLst>
+              <a:ext uri="{FF2B5EF4-FFF2-40B4-BE49-F238E27FC236}">
+                <a16:creationId xmlns:a16="http://schemas.microsoft.com/office/drawing/2014/main" id="{B1300DFB-F7A0-3AE1-8D8C-2D16867CB0F9}"/>
+              </a:ext>
+            </a:extLst>
+          </p:cNvPr>
+          <p:cNvSpPr txBox="1"/>
+          <p:nvPr/>
+        </p:nvSpPr>
+        <p:spPr bwMode="auto">
+          <a:xfrm>
+            <a:off x="301898" y="1488103"/>
+            <a:ext cx="8820149" cy="4893647"/>
+          </a:xfrm>
+          <a:prstGeom prst="rect">
+            <a:avLst/>
+          </a:prstGeom>
+          <a:noFill/>
+          <a:ln w="9525">
+            <a:noFill/>
+            <a:miter lim="800000"/>
+            <a:headEnd/>
+            <a:tailEnd/>
+          </a:ln>
+        </p:spPr>
+        <p:txBody>
+          <a:bodyPr wrap="square">
+            <a:spAutoFit/>
+          </a:bodyPr>
+          <a:lstStyle/>
+          <a:p>
+            <a:r>
+              <a:rPr lang="en-US" b="0" dirty="0">
+                <a:solidFill>
+                  <a:srgbClr val="800000"/>
+                </a:solidFill>
+                <a:effectLst/>
+                <a:highlight>
+                  <a:srgbClr val="FFFFFF"/>
+                </a:highlight>
+                <a:latin typeface="Consolas" panose="020B0609020204030204" pitchFamily="49" charset="0"/>
+              </a:rPr>
+              <a:t>.maven:</a:t>
+            </a:r>
+          </a:p>
+          <a:p>
+            <a:r>
+              <a:rPr lang="en-US" b="0" dirty="0">
+                <a:solidFill>
+                  <a:srgbClr val="800000"/>
+                </a:solidFill>
+                <a:effectLst/>
+                <a:highlight>
+                  <a:srgbClr val="FFFFFF"/>
+                </a:highlight>
+                <a:latin typeface="Consolas" panose="020B0609020204030204" pitchFamily="49" charset="0"/>
+              </a:rPr>
+              <a:t>  stage: </a:t>
+            </a:r>
+            <a:r>
+              <a:rPr lang="en-US" b="0" dirty="0">
+                <a:solidFill>
+                  <a:srgbClr val="0249FC"/>
+                </a:solidFill>
+                <a:effectLst/>
+                <a:highlight>
+                  <a:srgbClr val="FFFFFF"/>
+                </a:highlight>
+                <a:latin typeface="Consolas" panose="020B0609020204030204" pitchFamily="49" charset="0"/>
+              </a:rPr>
+              <a:t>build</a:t>
+            </a:r>
+          </a:p>
+          <a:p>
+            <a:r>
+              <a:rPr lang="en-US" b="0" dirty="0">
+                <a:solidFill>
+                  <a:srgbClr val="800000"/>
+                </a:solidFill>
+                <a:effectLst/>
+                <a:highlight>
+                  <a:srgbClr val="FFFFFF"/>
+                </a:highlight>
+                <a:latin typeface="Consolas" panose="020B0609020204030204" pitchFamily="49" charset="0"/>
+              </a:rPr>
+              <a:t>  image: </a:t>
+            </a:r>
+            <a:r>
+              <a:rPr lang="en-US" b="0" dirty="0">
+                <a:solidFill>
+                  <a:srgbClr val="0249FC"/>
+                </a:solidFill>
+                <a:effectLst/>
+                <a:highlight>
+                  <a:srgbClr val="FFFFFF"/>
+                </a:highlight>
+                <a:latin typeface="Consolas" panose="020B0609020204030204" pitchFamily="49" charset="0"/>
+              </a:rPr>
+              <a:t>maven:3.9.8-eclipse-temurin-11</a:t>
+            </a:r>
+          </a:p>
+          <a:p>
+            <a:endParaRPr lang="en-US" b="0" dirty="0">
+              <a:solidFill>
+                <a:srgbClr val="800000"/>
+              </a:solidFill>
+              <a:effectLst/>
+              <a:highlight>
+                <a:srgbClr val="FFFFFF"/>
+              </a:highlight>
+              <a:latin typeface="Consolas" panose="020B0609020204030204" pitchFamily="49" charset="0"/>
+            </a:endParaRPr>
+          </a:p>
+          <a:p>
+            <a:r>
+              <a:rPr lang="en-US" b="0" dirty="0">
+                <a:solidFill>
+                  <a:srgbClr val="800000"/>
+                </a:solidFill>
+                <a:effectLst/>
+                <a:highlight>
+                  <a:srgbClr val="FFFFFF"/>
+                </a:highlight>
+                <a:latin typeface="Consolas" panose="020B0609020204030204" pitchFamily="49" charset="0"/>
+              </a:rPr>
+              <a:t>compile:</a:t>
+            </a:r>
+          </a:p>
+          <a:p>
+            <a:r>
+              <a:rPr lang="en-US" b="0" dirty="0">
+                <a:solidFill>
+                  <a:srgbClr val="800000"/>
+                </a:solidFill>
+                <a:effectLst/>
+                <a:highlight>
+                  <a:srgbClr val="FFFFFF"/>
+                </a:highlight>
+                <a:latin typeface="Consolas" panose="020B0609020204030204" pitchFamily="49" charset="0"/>
+              </a:rPr>
+              <a:t>  extends: </a:t>
+            </a:r>
+            <a:r>
+              <a:rPr lang="en-US" b="0" dirty="0">
+                <a:solidFill>
+                  <a:srgbClr val="0249FC"/>
+                </a:solidFill>
+                <a:effectLst/>
+                <a:highlight>
+                  <a:srgbClr val="FFFFFF"/>
+                </a:highlight>
+                <a:latin typeface="Consolas" panose="020B0609020204030204" pitchFamily="49" charset="0"/>
+              </a:rPr>
+              <a:t>.maven</a:t>
+            </a:r>
+          </a:p>
+          <a:p>
+            <a:r>
+              <a:rPr lang="en-US" b="0" dirty="0">
+                <a:solidFill>
+                  <a:srgbClr val="800000"/>
+                </a:solidFill>
+                <a:effectLst/>
+                <a:highlight>
+                  <a:srgbClr val="FFFFFF"/>
+                </a:highlight>
+                <a:latin typeface="Consolas" panose="020B0609020204030204" pitchFamily="49" charset="0"/>
+              </a:rPr>
+              <a:t>  script:</a:t>
+            </a:r>
+          </a:p>
+          <a:p>
+            <a:r>
+              <a:rPr lang="en-US" b="0" dirty="0">
+                <a:solidFill>
+                  <a:srgbClr val="800000"/>
+                </a:solidFill>
+                <a:effectLst/>
+                <a:highlight>
+                  <a:srgbClr val="FFFFFF"/>
+                </a:highlight>
+                <a:latin typeface="Consolas" panose="020B0609020204030204" pitchFamily="49" charset="0"/>
+              </a:rPr>
+              <a:t>    - </a:t>
+            </a:r>
+            <a:r>
+              <a:rPr lang="en-US" b="0" dirty="0" err="1">
+                <a:solidFill>
+                  <a:srgbClr val="0249FC"/>
+                </a:solidFill>
+                <a:effectLst/>
+                <a:highlight>
+                  <a:srgbClr val="FFFFFF"/>
+                </a:highlight>
+                <a:latin typeface="Consolas" panose="020B0609020204030204" pitchFamily="49" charset="0"/>
+              </a:rPr>
+              <a:t>mvn</a:t>
+            </a:r>
+            <a:r>
+              <a:rPr lang="en-US" b="0" dirty="0">
+                <a:solidFill>
+                  <a:srgbClr val="0249FC"/>
+                </a:solidFill>
+                <a:effectLst/>
+                <a:highlight>
+                  <a:srgbClr val="FFFFFF"/>
+                </a:highlight>
+                <a:latin typeface="Consolas" panose="020B0609020204030204" pitchFamily="49" charset="0"/>
+              </a:rPr>
+              <a:t> clean compile</a:t>
+            </a:r>
+          </a:p>
+          <a:p>
+            <a:endParaRPr lang="en-US" b="0" dirty="0">
+              <a:solidFill>
+                <a:srgbClr val="800000"/>
+              </a:solidFill>
+              <a:effectLst/>
+              <a:highlight>
+                <a:srgbClr val="FFFFFF"/>
+              </a:highlight>
+              <a:latin typeface="Consolas" panose="020B0609020204030204" pitchFamily="49" charset="0"/>
+            </a:endParaRPr>
+          </a:p>
+          <a:p>
+            <a:r>
+              <a:rPr lang="en-US" b="0" dirty="0">
+                <a:solidFill>
+                  <a:srgbClr val="800000"/>
+                </a:solidFill>
+                <a:effectLst/>
+                <a:highlight>
+                  <a:srgbClr val="FFFFFF"/>
+                </a:highlight>
+                <a:latin typeface="Consolas" panose="020B0609020204030204" pitchFamily="49" charset="0"/>
+              </a:rPr>
+              <a:t>test:</a:t>
+            </a:r>
+          </a:p>
+          <a:p>
+            <a:r>
+              <a:rPr lang="en-US" b="0" dirty="0">
+                <a:solidFill>
+                  <a:srgbClr val="800000"/>
+                </a:solidFill>
+                <a:effectLst/>
+                <a:highlight>
+                  <a:srgbClr val="FFFFFF"/>
+                </a:highlight>
+                <a:latin typeface="Consolas" panose="020B0609020204030204" pitchFamily="49" charset="0"/>
+              </a:rPr>
+              <a:t>  extends: </a:t>
+            </a:r>
+            <a:r>
+              <a:rPr lang="en-US" b="0" dirty="0">
+                <a:solidFill>
+                  <a:srgbClr val="0249FC"/>
+                </a:solidFill>
+                <a:effectLst/>
+                <a:highlight>
+                  <a:srgbClr val="FFFFFF"/>
+                </a:highlight>
+                <a:latin typeface="Consolas" panose="020B0609020204030204" pitchFamily="49" charset="0"/>
+              </a:rPr>
+              <a:t>.maven</a:t>
+            </a:r>
+          </a:p>
+          <a:p>
+            <a:r>
+              <a:rPr lang="en-US" b="0" dirty="0">
+                <a:solidFill>
+                  <a:srgbClr val="800000"/>
+                </a:solidFill>
+                <a:effectLst/>
+                <a:highlight>
+                  <a:srgbClr val="FFFFFF"/>
+                </a:highlight>
+                <a:latin typeface="Consolas" panose="020B0609020204030204" pitchFamily="49" charset="0"/>
+              </a:rPr>
+              <a:t>  script:</a:t>
+            </a:r>
+          </a:p>
+          <a:p>
+            <a:r>
+              <a:rPr lang="en-US" b="0" dirty="0">
+                <a:solidFill>
+                  <a:srgbClr val="800000"/>
+                </a:solidFill>
+                <a:effectLst/>
+                <a:highlight>
+                  <a:srgbClr val="FFFFFF"/>
+                </a:highlight>
+                <a:latin typeface="Consolas" panose="020B0609020204030204" pitchFamily="49" charset="0"/>
+              </a:rPr>
+              <a:t>    - </a:t>
+            </a:r>
+            <a:r>
+              <a:rPr lang="en-US" b="0" dirty="0" err="1">
+                <a:solidFill>
+                  <a:srgbClr val="0249FC"/>
+                </a:solidFill>
+                <a:effectLst/>
+                <a:highlight>
+                  <a:srgbClr val="FFFFFF"/>
+                </a:highlight>
+                <a:latin typeface="Consolas" panose="020B0609020204030204" pitchFamily="49" charset="0"/>
+              </a:rPr>
+              <a:t>mvn</a:t>
+            </a:r>
+            <a:r>
+              <a:rPr lang="en-US" b="0" dirty="0">
+                <a:solidFill>
+                  <a:srgbClr val="0249FC"/>
+                </a:solidFill>
+                <a:effectLst/>
+                <a:highlight>
+                  <a:srgbClr val="FFFFFF"/>
+                </a:highlight>
+                <a:latin typeface="Consolas" panose="020B0609020204030204" pitchFamily="49" charset="0"/>
+              </a:rPr>
+              <a:t> verify</a:t>
+            </a:r>
           </a:p>
         </p:txBody>
       </p:sp>
     </p:spTree>
     <p:extLst>
       <p:ext uri="{BB962C8B-B14F-4D97-AF65-F5344CB8AC3E}">
-        <p14:creationId xmlns:p14="http://schemas.microsoft.com/office/powerpoint/2010/main" val="1118458735"/>
+        <p14:creationId xmlns:p14="http://schemas.microsoft.com/office/powerpoint/2010/main" val="3798667439"/>
       </p:ext>
     </p:extLst>
   </p:cSld>
@@ -20978,6 +21646,1667 @@
 </file>
 
 <file path=ppt/slides/slide40.xml><?xml version="1.0" encoding="utf-8"?>
+<p:sld xmlns:a="http://schemas.openxmlformats.org/drawingml/2006/main" xmlns:r="http://schemas.openxmlformats.org/officeDocument/2006/relationships" xmlns:p="http://schemas.openxmlformats.org/presentationml/2006/main">
+  <p:cSld>
+    <p:spTree>
+      <p:nvGrpSpPr>
+        <p:cNvPr id="1" name=""/>
+        <p:cNvGrpSpPr/>
+        <p:nvPr/>
+      </p:nvGrpSpPr>
+      <p:grpSpPr>
+        <a:xfrm>
+          <a:off x="0" y="0"/>
+          <a:ext cx="0" cy="0"/>
+          <a:chOff x="0" y="0"/>
+          <a:chExt cx="0" cy="0"/>
+        </a:xfrm>
+      </p:grpSpPr>
+      <p:sp>
+        <p:nvSpPr>
+          <p:cNvPr id="2" name="Titel 1">
+            <a:extLst>
+              <a:ext uri="{FF2B5EF4-FFF2-40B4-BE49-F238E27FC236}">
+                <a16:creationId xmlns:a16="http://schemas.microsoft.com/office/drawing/2014/main" id="{74F61811-DDD3-CD36-300B-D3CAEEBD8E91}"/>
+              </a:ext>
+            </a:extLst>
+          </p:cNvPr>
+          <p:cNvSpPr>
+            <a:spLocks noGrp="1"/>
+          </p:cNvSpPr>
+          <p:nvPr>
+            <p:ph type="title"/>
+          </p:nvPr>
+        </p:nvSpPr>
+        <p:spPr/>
+        <p:txBody>
+          <a:bodyPr/>
+          <a:lstStyle/>
+          <a:p>
+            <a:r>
+              <a:rPr lang="de-DE" dirty="0"/>
+              <a:t>CI/CD</a:t>
+            </a:r>
+          </a:p>
+        </p:txBody>
+      </p:sp>
+      <p:sp>
+        <p:nvSpPr>
+          <p:cNvPr id="10" name="Inhaltsplatzhalter 2">
+            <a:extLst>
+              <a:ext uri="{FF2B5EF4-FFF2-40B4-BE49-F238E27FC236}">
+                <a16:creationId xmlns:a16="http://schemas.microsoft.com/office/drawing/2014/main" id="{65F4F27F-EA27-84BE-FDD1-AE4BEA6A264F}"/>
+              </a:ext>
+            </a:extLst>
+          </p:cNvPr>
+          <p:cNvSpPr>
+            <a:spLocks noGrp="1"/>
+          </p:cNvSpPr>
+          <p:nvPr>
+            <p:ph idx="1"/>
+          </p:nvPr>
+        </p:nvSpPr>
+        <p:spPr>
+          <a:xfrm>
+            <a:off x="303213" y="981075"/>
+            <a:ext cx="8516937" cy="5400675"/>
+          </a:xfrm>
+        </p:spPr>
+        <p:txBody>
+          <a:bodyPr/>
+          <a:lstStyle/>
+          <a:p>
+            <a:pPr marL="0" indent="0">
+              <a:buNone/>
+            </a:pPr>
+            <a:r>
+              <a:rPr lang="de-DE" b="1" dirty="0"/>
+              <a:t>Aufgabe 7: Einführung von </a:t>
+            </a:r>
+            <a:r>
+              <a:rPr lang="de-DE" b="1" dirty="0" err="1"/>
+              <a:t>Extensions</a:t>
+            </a:r>
+            <a:endParaRPr lang="de-DE" dirty="0"/>
+          </a:p>
+          <a:p>
+            <a:pPr marL="457200" indent="-457200">
+              <a:buAutoNum type="arabicPeriod"/>
+            </a:pPr>
+            <a:r>
+              <a:rPr lang="de-DE" b="1" dirty="0"/>
+              <a:t>Ziel</a:t>
+            </a:r>
+            <a:r>
+              <a:rPr lang="de-DE" dirty="0"/>
+              <a:t>: Lerne, </a:t>
+            </a:r>
+            <a:r>
+              <a:rPr lang="de-DE" dirty="0">
+                <a:ea typeface="+mn-lt"/>
+                <a:cs typeface="+mn-lt"/>
+              </a:rPr>
+              <a:t>wie man </a:t>
+            </a:r>
+            <a:r>
+              <a:rPr lang="de-DE" dirty="0" err="1">
+                <a:ea typeface="+mn-lt"/>
+                <a:cs typeface="+mn-lt"/>
+              </a:rPr>
+              <a:t>Extensions</a:t>
+            </a:r>
+            <a:r>
+              <a:rPr lang="de-DE" dirty="0">
+                <a:ea typeface="+mn-lt"/>
+                <a:cs typeface="+mn-lt"/>
+              </a:rPr>
+              <a:t> in </a:t>
+            </a:r>
+            <a:r>
+              <a:rPr lang="de-DE" dirty="0" err="1">
+                <a:ea typeface="+mn-lt"/>
+                <a:cs typeface="+mn-lt"/>
+              </a:rPr>
+              <a:t>GitLab</a:t>
+            </a:r>
+            <a:r>
+              <a:rPr lang="de-DE" dirty="0">
+                <a:ea typeface="+mn-lt"/>
+                <a:cs typeface="+mn-lt"/>
+              </a:rPr>
+              <a:t> CI/CD Pipelines verwenden kann, um den Aufbau des Codes zu verbessern.</a:t>
+            </a:r>
+            <a:endParaRPr lang="de-DE" dirty="0">
+              <a:cs typeface="Arial"/>
+            </a:endParaRPr>
+          </a:p>
+          <a:p>
+            <a:pPr marL="457200" indent="-457200">
+              <a:buFont typeface="+mj-lt"/>
+              <a:buAutoNum type="arabicPeriod"/>
+            </a:pPr>
+            <a:r>
+              <a:rPr lang="de-DE" b="1" dirty="0"/>
+              <a:t>Schritte</a:t>
+            </a:r>
+            <a:r>
+              <a:rPr lang="de-DE" dirty="0"/>
+              <a:t>:</a:t>
+            </a:r>
+          </a:p>
+          <a:p>
+            <a:pPr lvl="1">
+              <a:buFont typeface="Arial" panose="020B0604020202020204" pitchFamily="34" charset="0"/>
+              <a:buChar char="•"/>
+            </a:pPr>
+            <a:r>
+              <a:rPr lang="de-DE" dirty="0">
+                <a:cs typeface="Arial"/>
+              </a:rPr>
+              <a:t>Ersetzen Sie den </a:t>
+            </a:r>
+            <a:r>
+              <a:rPr lang="de-DE" dirty="0" err="1">
+                <a:cs typeface="Arial"/>
+              </a:rPr>
+              <a:t>defaults</a:t>
+            </a:r>
+            <a:r>
+              <a:rPr lang="de-DE" dirty="0">
+                <a:cs typeface="Arial"/>
+              </a:rPr>
+              <a:t> Bereich durch einen </a:t>
+            </a:r>
+            <a:r>
+              <a:rPr lang="de-DE" dirty="0" err="1">
+                <a:cs typeface="Arial"/>
+              </a:rPr>
+              <a:t>job</a:t>
+            </a:r>
+            <a:r>
+              <a:rPr lang="de-DE" dirty="0">
+                <a:cs typeface="Arial"/>
+              </a:rPr>
+              <a:t> in der </a:t>
+            </a:r>
+            <a:r>
+              <a:rPr lang="de-DE" dirty="0" err="1">
+                <a:cs typeface="Arial"/>
+              </a:rPr>
+              <a:t>build</a:t>
+            </a:r>
+            <a:r>
+              <a:rPr lang="de-DE" dirty="0">
+                <a:cs typeface="Arial"/>
+              </a:rPr>
+              <a:t> Stage</a:t>
+            </a:r>
+          </a:p>
+          <a:p>
+            <a:pPr lvl="1">
+              <a:buFont typeface="Arial" panose="020B0604020202020204" pitchFamily="34" charset="0"/>
+              <a:buChar char="•"/>
+            </a:pPr>
+            <a:r>
+              <a:rPr lang="de-DE" dirty="0">
+                <a:cs typeface="Arial"/>
+              </a:rPr>
+              <a:t>Lassen Sie den </a:t>
+            </a:r>
+            <a:r>
+              <a:rPr lang="de-DE" dirty="0" err="1">
+                <a:cs typeface="Arial"/>
+              </a:rPr>
+              <a:t>build_job</a:t>
+            </a:r>
+            <a:r>
+              <a:rPr lang="de-DE" dirty="0">
+                <a:cs typeface="Arial"/>
+              </a:rPr>
+              <a:t> diesen </a:t>
+            </a:r>
+            <a:r>
+              <a:rPr lang="de-DE" dirty="0" err="1">
+                <a:cs typeface="Arial"/>
+              </a:rPr>
+              <a:t>job</a:t>
+            </a:r>
+            <a:r>
+              <a:rPr lang="de-DE" dirty="0">
+                <a:cs typeface="Arial"/>
+              </a:rPr>
+              <a:t> </a:t>
+            </a:r>
+            <a:r>
+              <a:rPr lang="de-DE" dirty="0" err="1">
+                <a:cs typeface="Arial"/>
+              </a:rPr>
+              <a:t>extenden</a:t>
+            </a:r>
+            <a:endParaRPr lang="de-DE" dirty="0">
+              <a:cs typeface="Arial"/>
+            </a:endParaRPr>
+          </a:p>
+          <a:p>
+            <a:pPr>
+              <a:buFont typeface="Arial" panose="020B0604020202020204" pitchFamily="34" charset="0"/>
+              <a:buChar char="•"/>
+            </a:pPr>
+            <a:endParaRPr lang="de-DE" dirty="0"/>
+          </a:p>
+        </p:txBody>
+      </p:sp>
+    </p:spTree>
+    <p:extLst>
+      <p:ext uri="{BB962C8B-B14F-4D97-AF65-F5344CB8AC3E}">
+        <p14:creationId xmlns:p14="http://schemas.microsoft.com/office/powerpoint/2010/main" val="1056612356"/>
+      </p:ext>
+    </p:extLst>
+  </p:cSld>
+  <p:clrMapOvr>
+    <a:masterClrMapping/>
+  </p:clrMapOvr>
+</p:sld>
+</file>
+
+<file path=ppt/slides/slide41.xml><?xml version="1.0" encoding="utf-8"?>
+<p:sld xmlns:a="http://schemas.openxmlformats.org/drawingml/2006/main" xmlns:r="http://schemas.openxmlformats.org/officeDocument/2006/relationships" xmlns:p="http://schemas.openxmlformats.org/presentationml/2006/main">
+  <p:cSld>
+    <p:spTree>
+      <p:nvGrpSpPr>
+        <p:cNvPr id="1" name=""/>
+        <p:cNvGrpSpPr/>
+        <p:nvPr/>
+      </p:nvGrpSpPr>
+      <p:grpSpPr>
+        <a:xfrm>
+          <a:off x="0" y="0"/>
+          <a:ext cx="0" cy="0"/>
+          <a:chOff x="0" y="0"/>
+          <a:chExt cx="0" cy="0"/>
+        </a:xfrm>
+      </p:grpSpPr>
+      <p:sp>
+        <p:nvSpPr>
+          <p:cNvPr id="2" name="Titel 1">
+            <a:extLst>
+              <a:ext uri="{FF2B5EF4-FFF2-40B4-BE49-F238E27FC236}">
+                <a16:creationId xmlns:a16="http://schemas.microsoft.com/office/drawing/2014/main" id="{A2A2EB4E-4B87-3A94-66CB-0424D340A9D6}"/>
+              </a:ext>
+            </a:extLst>
+          </p:cNvPr>
+          <p:cNvSpPr>
+            <a:spLocks noGrp="1"/>
+          </p:cNvSpPr>
+          <p:nvPr>
+            <p:ph type="title"/>
+          </p:nvPr>
+        </p:nvSpPr>
+        <p:spPr/>
+        <p:txBody>
+          <a:bodyPr/>
+          <a:lstStyle/>
+          <a:p>
+            <a:r>
+              <a:rPr lang="de-DE" dirty="0"/>
+              <a:t>CI/CD</a:t>
+            </a:r>
+          </a:p>
+        </p:txBody>
+      </p:sp>
+      <p:sp>
+        <p:nvSpPr>
+          <p:cNvPr id="10" name="Inhaltsplatzhalter 2">
+            <a:extLst>
+              <a:ext uri="{FF2B5EF4-FFF2-40B4-BE49-F238E27FC236}">
+                <a16:creationId xmlns:a16="http://schemas.microsoft.com/office/drawing/2014/main" id="{F2E8AEA4-8F06-E96C-F551-3CA6B4EF1E8C}"/>
+              </a:ext>
+            </a:extLst>
+          </p:cNvPr>
+          <p:cNvSpPr>
+            <a:spLocks noGrp="1"/>
+          </p:cNvSpPr>
+          <p:nvPr>
+            <p:ph idx="1"/>
+          </p:nvPr>
+        </p:nvSpPr>
+        <p:spPr>
+          <a:xfrm>
+            <a:off x="303213" y="981075"/>
+            <a:ext cx="8516937" cy="5400675"/>
+          </a:xfrm>
+        </p:spPr>
+        <p:txBody>
+          <a:bodyPr/>
+          <a:lstStyle/>
+          <a:p>
+            <a:pPr marL="0" indent="0">
+              <a:buNone/>
+            </a:pPr>
+            <a:r>
+              <a:rPr lang="de-DE" b="1" dirty="0"/>
+              <a:t>Aufgabe 7: Einführung von </a:t>
+            </a:r>
+            <a:r>
+              <a:rPr lang="de-DE" b="1" dirty="0" err="1"/>
+              <a:t>Extensions</a:t>
+            </a:r>
+            <a:endParaRPr lang="de-DE" dirty="0"/>
+          </a:p>
+          <a:p>
+            <a:pPr>
+              <a:buFont typeface="Arial" panose="020B0604020202020204" pitchFamily="34" charset="0"/>
+              <a:buChar char="•"/>
+            </a:pPr>
+            <a:r>
+              <a:rPr lang="de-DE" dirty="0"/>
+              <a:t>Mögliche Lösung:</a:t>
+            </a:r>
+          </a:p>
+          <a:p>
+            <a:pPr lvl="1">
+              <a:buFont typeface="Arial" panose="020B0604020202020204" pitchFamily="34" charset="0"/>
+              <a:buChar char="•"/>
+            </a:pPr>
+            <a:endParaRPr lang="de-DE" dirty="0"/>
+          </a:p>
+        </p:txBody>
+      </p:sp>
+      <p:sp>
+        <p:nvSpPr>
+          <p:cNvPr id="4" name="Textfeld 3">
+            <a:extLst>
+              <a:ext uri="{FF2B5EF4-FFF2-40B4-BE49-F238E27FC236}">
+                <a16:creationId xmlns:a16="http://schemas.microsoft.com/office/drawing/2014/main" id="{A0516D05-F548-F56C-DF2F-B5B2036DC0D5}"/>
+              </a:ext>
+            </a:extLst>
+          </p:cNvPr>
+          <p:cNvSpPr txBox="1"/>
+          <p:nvPr/>
+        </p:nvSpPr>
+        <p:spPr bwMode="auto">
+          <a:xfrm>
+            <a:off x="2195736" y="1850534"/>
+            <a:ext cx="4983111" cy="4624343"/>
+          </a:xfrm>
+          <a:prstGeom prst="rect">
+            <a:avLst/>
+          </a:prstGeom>
+          <a:noFill/>
+          <a:ln w="9525">
+            <a:noFill/>
+            <a:miter lim="800000"/>
+            <a:headEnd/>
+            <a:tailEnd/>
+          </a:ln>
+        </p:spPr>
+        <p:txBody>
+          <a:bodyPr rot="0" spcFirstLastPara="0" vertOverflow="overflow" horzOverflow="overflow" vert="horz" wrap="square" lIns="91440" tIns="45720" rIns="91440" bIns="45720" numCol="1" spcCol="0" rtlCol="0" fromWordArt="0" anchor="ctr" anchorCtr="0" forceAA="0" compatLnSpc="1">
+            <a:prstTxWarp prst="textNoShape">
+              <a:avLst/>
+            </a:prstTxWarp>
+            <a:spAutoFit/>
+          </a:bodyPr>
+          <a:lstStyle/>
+          <a:p>
+            <a:pPr eaLnBrk="1" hangingPunct="1"/>
+            <a:r>
+              <a:rPr lang="en-US" sz="950" dirty="0">
+                <a:solidFill>
+                  <a:srgbClr val="800000"/>
+                </a:solidFill>
+                <a:latin typeface="Consolas"/>
+              </a:rPr>
+              <a:t>variables</a:t>
+            </a:r>
+            <a:r>
+              <a:rPr lang="en-US" sz="950" dirty="0">
+                <a:solidFill>
+                  <a:srgbClr val="3B3B3B"/>
+                </a:solidFill>
+                <a:latin typeface="Consolas"/>
+              </a:rPr>
+              <a:t>:</a:t>
+            </a:r>
+          </a:p>
+          <a:p>
+            <a:pPr eaLnBrk="1" hangingPunct="1"/>
+            <a:r>
+              <a:rPr lang="en-US" sz="950" dirty="0">
+                <a:solidFill>
+                  <a:srgbClr val="800000"/>
+                </a:solidFill>
+                <a:latin typeface="Consolas"/>
+              </a:rPr>
+              <a:t>  DUMMY_FILE</a:t>
+            </a:r>
+            <a:r>
+              <a:rPr lang="en-US" sz="950" dirty="0">
+                <a:solidFill>
+                  <a:srgbClr val="3B3B3B"/>
+                </a:solidFill>
+                <a:latin typeface="Consolas"/>
+              </a:rPr>
+              <a:t>: </a:t>
+            </a:r>
+            <a:r>
+              <a:rPr lang="en-US" sz="950" dirty="0">
+                <a:solidFill>
+                  <a:srgbClr val="A31515"/>
+                </a:solidFill>
+                <a:latin typeface="Consolas"/>
+              </a:rPr>
+              <a:t>"dummy_file.txt"</a:t>
+            </a:r>
+          </a:p>
+          <a:p>
+            <a:pPr eaLnBrk="1" hangingPunct="1"/>
+            <a:br>
+              <a:rPr lang="en-US" sz="950" dirty="0">
+                <a:latin typeface="Consolas"/>
+              </a:rPr>
+            </a:br>
+            <a:r>
+              <a:rPr lang="en-US" sz="950" dirty="0">
+                <a:solidFill>
+                  <a:srgbClr val="800000"/>
+                </a:solidFill>
+                <a:latin typeface="Consolas"/>
+              </a:rPr>
+              <a:t>stages</a:t>
+            </a:r>
+            <a:r>
+              <a:rPr lang="en-US" sz="950" dirty="0">
+                <a:solidFill>
+                  <a:srgbClr val="3B3B3B"/>
+                </a:solidFill>
+                <a:latin typeface="Consolas"/>
+              </a:rPr>
+              <a:t>:</a:t>
+            </a:r>
+          </a:p>
+          <a:p>
+            <a:pPr eaLnBrk="1" hangingPunct="1"/>
+            <a:r>
+              <a:rPr lang="en-US" sz="950" dirty="0">
+                <a:solidFill>
+                  <a:srgbClr val="3B3B3B"/>
+                </a:solidFill>
+                <a:latin typeface="Consolas"/>
+              </a:rPr>
+              <a:t>  - </a:t>
+            </a:r>
+            <a:r>
+              <a:rPr lang="en-US" sz="950" dirty="0">
+                <a:solidFill>
+                  <a:srgbClr val="0000FF"/>
+                </a:solidFill>
+                <a:latin typeface="Consolas"/>
+              </a:rPr>
+              <a:t>build</a:t>
+            </a:r>
+          </a:p>
+          <a:p>
+            <a:pPr eaLnBrk="1" hangingPunct="1"/>
+            <a:r>
+              <a:rPr lang="en-US" sz="950" dirty="0">
+                <a:solidFill>
+                  <a:srgbClr val="3B3B3B"/>
+                </a:solidFill>
+                <a:latin typeface="Consolas"/>
+              </a:rPr>
+              <a:t>  - </a:t>
+            </a:r>
+            <a:r>
+              <a:rPr lang="en-US" sz="950" dirty="0">
+                <a:solidFill>
+                  <a:srgbClr val="0000FF"/>
+                </a:solidFill>
+                <a:latin typeface="Consolas"/>
+              </a:rPr>
+              <a:t>test</a:t>
+            </a:r>
+          </a:p>
+          <a:p>
+            <a:pPr eaLnBrk="1" hangingPunct="1"/>
+            <a:r>
+              <a:rPr lang="en-US" sz="950" dirty="0">
+                <a:solidFill>
+                  <a:srgbClr val="3B3B3B"/>
+                </a:solidFill>
+                <a:latin typeface="Consolas"/>
+              </a:rPr>
+              <a:t>  - </a:t>
+            </a:r>
+            <a:r>
+              <a:rPr lang="en-US" sz="950" dirty="0">
+                <a:solidFill>
+                  <a:srgbClr val="0000FF"/>
+                </a:solidFill>
+                <a:latin typeface="Consolas"/>
+              </a:rPr>
+              <a:t>deploy</a:t>
+            </a:r>
+          </a:p>
+          <a:p>
+            <a:pPr eaLnBrk="1" hangingPunct="1"/>
+            <a:endParaRPr lang="en-US" sz="950" dirty="0">
+              <a:solidFill>
+                <a:srgbClr val="0000FF"/>
+              </a:solidFill>
+              <a:latin typeface="Consolas"/>
+            </a:endParaRPr>
+          </a:p>
+          <a:p>
+            <a:pPr eaLnBrk="1" hangingPunct="1"/>
+            <a:r>
+              <a:rPr lang="en-US" sz="950" dirty="0">
+                <a:solidFill>
+                  <a:srgbClr val="800000"/>
+                </a:solidFill>
+                <a:latin typeface="Consolas"/>
+              </a:rPr>
+              <a:t>.default-build:</a:t>
+            </a:r>
+          </a:p>
+          <a:p>
+            <a:pPr eaLnBrk="1" hangingPunct="1"/>
+            <a:r>
+              <a:rPr lang="en-US" sz="950" dirty="0">
+                <a:solidFill>
+                  <a:srgbClr val="800000"/>
+                </a:solidFill>
+                <a:latin typeface="Consolas"/>
+              </a:rPr>
+              <a:t>   stage</a:t>
+            </a:r>
+            <a:r>
+              <a:rPr lang="en-US" sz="950" dirty="0">
+                <a:solidFill>
+                  <a:srgbClr val="3B3B3B"/>
+                </a:solidFill>
+                <a:latin typeface="Consolas"/>
+              </a:rPr>
+              <a:t>: </a:t>
+            </a:r>
+            <a:r>
+              <a:rPr lang="en-US" sz="950" dirty="0">
+                <a:solidFill>
+                  <a:srgbClr val="0000FF"/>
+                </a:solidFill>
+                <a:latin typeface="Consolas"/>
+              </a:rPr>
+              <a:t>build</a:t>
+            </a:r>
+          </a:p>
+          <a:p>
+            <a:pPr eaLnBrk="1" hangingPunct="1"/>
+            <a:br>
+              <a:rPr lang="en-US" sz="950" dirty="0">
+                <a:latin typeface="Consolas"/>
+              </a:rPr>
+            </a:br>
+            <a:r>
+              <a:rPr lang="en-US" sz="950" dirty="0" err="1">
+                <a:solidFill>
+                  <a:srgbClr val="800000"/>
+                </a:solidFill>
+                <a:latin typeface="Consolas"/>
+              </a:rPr>
+              <a:t>build_job</a:t>
+            </a:r>
+            <a:r>
+              <a:rPr lang="en-US" sz="950" dirty="0">
+                <a:solidFill>
+                  <a:srgbClr val="3B3B3B"/>
+                </a:solidFill>
+                <a:latin typeface="Consolas"/>
+              </a:rPr>
+              <a:t>:</a:t>
+            </a:r>
+            <a:endParaRPr lang="en-US" sz="950" dirty="0">
+              <a:solidFill>
+                <a:srgbClr val="800000"/>
+              </a:solidFill>
+              <a:latin typeface="Consolas"/>
+            </a:endParaRPr>
+          </a:p>
+          <a:p>
+            <a:pPr eaLnBrk="1" hangingPunct="1"/>
+            <a:r>
+              <a:rPr lang="en-US" sz="950" dirty="0">
+                <a:solidFill>
+                  <a:srgbClr val="800000"/>
+                </a:solidFill>
+                <a:latin typeface="Consolas"/>
+              </a:rPr>
+              <a:t>  extends: </a:t>
+            </a:r>
+            <a:r>
+              <a:rPr lang="en-US" sz="950" dirty="0">
+                <a:solidFill>
+                  <a:srgbClr val="0000FF"/>
+                </a:solidFill>
+                <a:latin typeface="Consolas"/>
+              </a:rPr>
+              <a:t>.default-build</a:t>
+            </a:r>
+            <a:endParaRPr lang="en-US" sz="950" dirty="0">
+              <a:solidFill>
+                <a:srgbClr val="800000"/>
+              </a:solidFill>
+              <a:latin typeface="Consolas"/>
+            </a:endParaRPr>
+          </a:p>
+          <a:p>
+            <a:pPr eaLnBrk="1" hangingPunct="1"/>
+            <a:r>
+              <a:rPr lang="en-US" sz="950" dirty="0">
+                <a:solidFill>
+                  <a:srgbClr val="800000"/>
+                </a:solidFill>
+                <a:latin typeface="Consolas"/>
+              </a:rPr>
+              <a:t>  script</a:t>
+            </a:r>
+            <a:r>
+              <a:rPr lang="en-US" sz="950" dirty="0">
+                <a:solidFill>
+                  <a:srgbClr val="3B3B3B"/>
+                </a:solidFill>
+                <a:latin typeface="Consolas"/>
+              </a:rPr>
+              <a:t>:</a:t>
+            </a:r>
+          </a:p>
+          <a:p>
+            <a:pPr eaLnBrk="1" hangingPunct="1"/>
+            <a:r>
+              <a:rPr lang="en-US" sz="950" dirty="0">
+                <a:solidFill>
+                  <a:srgbClr val="3B3B3B"/>
+                </a:solidFill>
+                <a:latin typeface="Consolas"/>
+              </a:rPr>
+              <a:t>    - </a:t>
+            </a:r>
+            <a:r>
+              <a:rPr lang="en-US" sz="950" dirty="0">
+                <a:solidFill>
+                  <a:srgbClr val="0000FF"/>
+                </a:solidFill>
+                <a:latin typeface="Consolas"/>
+              </a:rPr>
+              <a:t>echo "Building the project..."</a:t>
+            </a:r>
+          </a:p>
+          <a:p>
+            <a:pPr eaLnBrk="1" hangingPunct="1"/>
+            <a:r>
+              <a:rPr lang="en-US" sz="950" dirty="0">
+                <a:solidFill>
+                  <a:srgbClr val="3B3B3B"/>
+                </a:solidFill>
+                <a:latin typeface="Consolas"/>
+              </a:rPr>
+              <a:t>    - </a:t>
+            </a:r>
+            <a:r>
+              <a:rPr lang="en-US" sz="950" dirty="0">
+                <a:solidFill>
+                  <a:srgbClr val="0000FF"/>
+                </a:solidFill>
+                <a:latin typeface="Consolas"/>
+              </a:rPr>
+              <a:t>touch $DUMMY_FILE</a:t>
+            </a:r>
+          </a:p>
+          <a:p>
+            <a:pPr eaLnBrk="1" hangingPunct="1"/>
+            <a:r>
+              <a:rPr lang="en-US" sz="950" dirty="0">
+                <a:solidFill>
+                  <a:srgbClr val="800000"/>
+                </a:solidFill>
+                <a:latin typeface="Consolas"/>
+              </a:rPr>
+              <a:t>artifacts</a:t>
+            </a:r>
+            <a:r>
+              <a:rPr lang="en-US" sz="950" dirty="0">
+                <a:solidFill>
+                  <a:srgbClr val="3B3B3B"/>
+                </a:solidFill>
+                <a:latin typeface="Consolas"/>
+              </a:rPr>
+              <a:t>:</a:t>
+            </a:r>
+          </a:p>
+          <a:p>
+            <a:pPr eaLnBrk="1" hangingPunct="1"/>
+            <a:r>
+              <a:rPr lang="en-US" sz="950" dirty="0">
+                <a:solidFill>
+                  <a:srgbClr val="800000"/>
+                </a:solidFill>
+                <a:latin typeface="Consolas"/>
+              </a:rPr>
+              <a:t>  paths</a:t>
+            </a:r>
+            <a:r>
+              <a:rPr lang="en-US" sz="950" dirty="0">
+                <a:solidFill>
+                  <a:srgbClr val="3B3B3B"/>
+                </a:solidFill>
+                <a:latin typeface="Consolas"/>
+              </a:rPr>
+              <a:t>:</a:t>
+            </a:r>
+          </a:p>
+          <a:p>
+            <a:pPr eaLnBrk="1" hangingPunct="1"/>
+            <a:r>
+              <a:rPr lang="en-US" sz="950" dirty="0">
+                <a:solidFill>
+                  <a:srgbClr val="3B3B3B"/>
+                </a:solidFill>
+                <a:latin typeface="Consolas"/>
+              </a:rPr>
+              <a:t>    - </a:t>
+            </a:r>
+            <a:r>
+              <a:rPr lang="en-US" sz="950" dirty="0">
+                <a:solidFill>
+                  <a:srgbClr val="0000FF"/>
+                </a:solidFill>
+                <a:latin typeface="Consolas"/>
+              </a:rPr>
+              <a:t>$DUMMY_FILE</a:t>
+            </a:r>
+          </a:p>
+          <a:p>
+            <a:pPr eaLnBrk="1" hangingPunct="1"/>
+            <a:br>
+              <a:rPr lang="en-US" sz="950" dirty="0">
+                <a:latin typeface="Consolas"/>
+              </a:rPr>
+            </a:br>
+            <a:r>
+              <a:rPr lang="en-US" sz="950" dirty="0" err="1">
+                <a:solidFill>
+                  <a:srgbClr val="800000"/>
+                </a:solidFill>
+                <a:latin typeface="Consolas"/>
+              </a:rPr>
+              <a:t>test_job</a:t>
+            </a:r>
+            <a:r>
+              <a:rPr lang="en-US" sz="950" dirty="0">
+                <a:solidFill>
+                  <a:srgbClr val="3B3B3B"/>
+                </a:solidFill>
+                <a:latin typeface="Consolas"/>
+              </a:rPr>
+              <a:t>:</a:t>
+            </a:r>
+          </a:p>
+          <a:p>
+            <a:pPr eaLnBrk="1" hangingPunct="1"/>
+            <a:r>
+              <a:rPr lang="en-US" sz="950" dirty="0">
+                <a:solidFill>
+                  <a:srgbClr val="800000"/>
+                </a:solidFill>
+                <a:latin typeface="Consolas"/>
+              </a:rPr>
+              <a:t>  stage</a:t>
+            </a:r>
+            <a:r>
+              <a:rPr lang="en-US" sz="950" dirty="0">
+                <a:solidFill>
+                  <a:srgbClr val="3B3B3B"/>
+                </a:solidFill>
+                <a:latin typeface="Consolas"/>
+              </a:rPr>
+              <a:t>: </a:t>
+            </a:r>
+            <a:r>
+              <a:rPr lang="en-US" sz="950" dirty="0">
+                <a:solidFill>
+                  <a:srgbClr val="0000FF"/>
+                </a:solidFill>
+                <a:latin typeface="Consolas"/>
+              </a:rPr>
+              <a:t>test</a:t>
+            </a:r>
+          </a:p>
+          <a:p>
+            <a:pPr eaLnBrk="1" hangingPunct="1"/>
+            <a:r>
+              <a:rPr lang="en-US" sz="950" dirty="0">
+                <a:solidFill>
+                  <a:srgbClr val="800000"/>
+                </a:solidFill>
+                <a:latin typeface="Consolas"/>
+              </a:rPr>
+              <a:t>  script</a:t>
+            </a:r>
+            <a:r>
+              <a:rPr lang="en-US" sz="950" dirty="0">
+                <a:solidFill>
+                  <a:srgbClr val="3B3B3B"/>
+                </a:solidFill>
+                <a:latin typeface="Consolas"/>
+              </a:rPr>
+              <a:t>:</a:t>
+            </a:r>
+          </a:p>
+          <a:p>
+            <a:pPr eaLnBrk="1" hangingPunct="1"/>
+            <a:r>
+              <a:rPr lang="en-US" sz="950" dirty="0">
+                <a:solidFill>
+                  <a:srgbClr val="3B3B3B"/>
+                </a:solidFill>
+                <a:latin typeface="Consolas"/>
+              </a:rPr>
+              <a:t>    - </a:t>
+            </a:r>
+            <a:r>
+              <a:rPr lang="en-US" sz="950" dirty="0">
+                <a:solidFill>
+                  <a:srgbClr val="0000FF"/>
+                </a:solidFill>
+                <a:latin typeface="Consolas"/>
+              </a:rPr>
+              <a:t>echo "Testing the project..."</a:t>
+            </a:r>
+          </a:p>
+          <a:p>
+            <a:pPr eaLnBrk="1" hangingPunct="1"/>
+            <a:r>
+              <a:rPr lang="en-US" sz="950" dirty="0">
+                <a:solidFill>
+                  <a:srgbClr val="3B3B3B"/>
+                </a:solidFill>
+                <a:latin typeface="Consolas"/>
+              </a:rPr>
+              <a:t>    - </a:t>
+            </a:r>
+            <a:r>
+              <a:rPr lang="en-US" sz="950" dirty="0">
+                <a:solidFill>
+                  <a:srgbClr val="0000FF"/>
+                </a:solidFill>
+                <a:latin typeface="Consolas"/>
+              </a:rPr>
+              <a:t>ls -l $DUMMY_FILE</a:t>
+            </a:r>
+          </a:p>
+          <a:p>
+            <a:pPr eaLnBrk="1" hangingPunct="1"/>
+            <a:br>
+              <a:rPr lang="en-US" sz="950" dirty="0">
+                <a:latin typeface="Consolas"/>
+              </a:rPr>
+            </a:br>
+            <a:r>
+              <a:rPr lang="en-US" sz="950" dirty="0" err="1">
+                <a:solidFill>
+                  <a:srgbClr val="800000"/>
+                </a:solidFill>
+                <a:latin typeface="Consolas"/>
+              </a:rPr>
+              <a:t>deploy_job</a:t>
+            </a:r>
+            <a:r>
+              <a:rPr lang="en-US" sz="950" dirty="0">
+                <a:solidFill>
+                  <a:srgbClr val="3B3B3B"/>
+                </a:solidFill>
+                <a:latin typeface="Consolas"/>
+              </a:rPr>
+              <a:t>:</a:t>
+            </a:r>
+          </a:p>
+          <a:p>
+            <a:pPr eaLnBrk="1" hangingPunct="1"/>
+            <a:r>
+              <a:rPr lang="en-US" sz="950" dirty="0">
+                <a:solidFill>
+                  <a:srgbClr val="800000"/>
+                </a:solidFill>
+                <a:latin typeface="Consolas"/>
+              </a:rPr>
+              <a:t>  stage</a:t>
+            </a:r>
+            <a:r>
+              <a:rPr lang="en-US" sz="950" dirty="0">
+                <a:solidFill>
+                  <a:srgbClr val="3B3B3B"/>
+                </a:solidFill>
+                <a:latin typeface="Consolas"/>
+              </a:rPr>
+              <a:t>: </a:t>
+            </a:r>
+            <a:r>
+              <a:rPr lang="en-US" sz="950" dirty="0">
+                <a:solidFill>
+                  <a:srgbClr val="0000FF"/>
+                </a:solidFill>
+                <a:latin typeface="Consolas"/>
+              </a:rPr>
+              <a:t>deploy</a:t>
+            </a:r>
+          </a:p>
+          <a:p>
+            <a:pPr eaLnBrk="1" hangingPunct="1"/>
+            <a:r>
+              <a:rPr lang="en-US" sz="950" dirty="0">
+                <a:solidFill>
+                  <a:srgbClr val="800000"/>
+                </a:solidFill>
+                <a:latin typeface="Consolas"/>
+              </a:rPr>
+              <a:t>  script</a:t>
+            </a:r>
+            <a:r>
+              <a:rPr lang="en-US" sz="950" dirty="0">
+                <a:solidFill>
+                  <a:srgbClr val="3B3B3B"/>
+                </a:solidFill>
+                <a:latin typeface="Consolas"/>
+              </a:rPr>
+              <a:t>:</a:t>
+            </a:r>
+          </a:p>
+          <a:p>
+            <a:pPr eaLnBrk="1" hangingPunct="1"/>
+            <a:r>
+              <a:rPr lang="en-US" sz="950" dirty="0">
+                <a:solidFill>
+                  <a:srgbClr val="3B3B3B"/>
+                </a:solidFill>
+                <a:latin typeface="Consolas"/>
+              </a:rPr>
+              <a:t>    - </a:t>
+            </a:r>
+            <a:r>
+              <a:rPr lang="en-US" sz="950" dirty="0">
+                <a:solidFill>
+                  <a:srgbClr val="0000FF"/>
+                </a:solidFill>
+                <a:latin typeface="Consolas"/>
+              </a:rPr>
+              <a:t>echo "Deploying the project..."</a:t>
+            </a:r>
+          </a:p>
+          <a:p>
+            <a:pPr eaLnBrk="1" hangingPunct="1"/>
+            <a:r>
+              <a:rPr lang="en-US" sz="950" dirty="0">
+                <a:solidFill>
+                  <a:srgbClr val="3B3B3B"/>
+                </a:solidFill>
+                <a:latin typeface="Consolas"/>
+              </a:rPr>
+              <a:t>    - </a:t>
+            </a:r>
+            <a:r>
+              <a:rPr lang="en-US" sz="950" dirty="0">
+                <a:solidFill>
+                  <a:srgbClr val="0000FF"/>
+                </a:solidFill>
+                <a:latin typeface="Consolas"/>
+              </a:rPr>
+              <a:t>ls -l $DUMMY_FILE</a:t>
+            </a:r>
+          </a:p>
+        </p:txBody>
+      </p:sp>
+    </p:spTree>
+    <p:extLst>
+      <p:ext uri="{BB962C8B-B14F-4D97-AF65-F5344CB8AC3E}">
+        <p14:creationId xmlns:p14="http://schemas.microsoft.com/office/powerpoint/2010/main" val="1786987750"/>
+      </p:ext>
+    </p:extLst>
+  </p:cSld>
+  <p:clrMapOvr>
+    <a:masterClrMapping/>
+  </p:clrMapOvr>
+</p:sld>
+</file>
+
+<file path=ppt/slides/slide42.xml><?xml version="1.0" encoding="utf-8"?>
+<p:sld xmlns:a="http://schemas.openxmlformats.org/drawingml/2006/main" xmlns:r="http://schemas.openxmlformats.org/officeDocument/2006/relationships" xmlns:p="http://schemas.openxmlformats.org/presentationml/2006/main">
+  <p:cSld>
+    <p:spTree>
+      <p:nvGrpSpPr>
+        <p:cNvPr id="1" name=""/>
+        <p:cNvGrpSpPr/>
+        <p:nvPr/>
+      </p:nvGrpSpPr>
+      <p:grpSpPr>
+        <a:xfrm>
+          <a:off x="0" y="0"/>
+          <a:ext cx="0" cy="0"/>
+          <a:chOff x="0" y="0"/>
+          <a:chExt cx="0" cy="0"/>
+        </a:xfrm>
+      </p:grpSpPr>
+      <p:sp>
+        <p:nvSpPr>
+          <p:cNvPr id="2" name="Titel 1">
+            <a:extLst>
+              <a:ext uri="{FF2B5EF4-FFF2-40B4-BE49-F238E27FC236}">
+                <a16:creationId xmlns:a16="http://schemas.microsoft.com/office/drawing/2014/main" id="{3363B985-2812-BDBB-7E9D-A28D84AB06EF}"/>
+              </a:ext>
+            </a:extLst>
+          </p:cNvPr>
+          <p:cNvSpPr>
+            <a:spLocks noGrp="1"/>
+          </p:cNvSpPr>
+          <p:nvPr>
+            <p:ph type="title"/>
+          </p:nvPr>
+        </p:nvSpPr>
+        <p:spPr/>
+        <p:txBody>
+          <a:bodyPr/>
+          <a:lstStyle/>
+          <a:p>
+            <a:r>
+              <a:rPr lang="de-DE" dirty="0"/>
+              <a:t>CI/CD</a:t>
+            </a:r>
+          </a:p>
+        </p:txBody>
+      </p:sp>
+      <p:sp>
+        <p:nvSpPr>
+          <p:cNvPr id="4" name="Inhaltsplatzhalter 2">
+            <a:extLst>
+              <a:ext uri="{FF2B5EF4-FFF2-40B4-BE49-F238E27FC236}">
+                <a16:creationId xmlns:a16="http://schemas.microsoft.com/office/drawing/2014/main" id="{FE26268B-C609-ACA5-B6B4-D8D23D94F991}"/>
+              </a:ext>
+            </a:extLst>
+          </p:cNvPr>
+          <p:cNvSpPr>
+            <a:spLocks noGrp="1"/>
+          </p:cNvSpPr>
+          <p:nvPr>
+            <p:ph idx="1"/>
+          </p:nvPr>
+        </p:nvSpPr>
+        <p:spPr>
+          <a:xfrm>
+            <a:off x="303213" y="981075"/>
+            <a:ext cx="8516937" cy="5400675"/>
+          </a:xfrm>
+        </p:spPr>
+        <p:txBody>
+          <a:bodyPr/>
+          <a:lstStyle/>
+          <a:p>
+            <a:pPr marL="0" indent="0">
+              <a:buNone/>
+            </a:pPr>
+            <a:r>
+              <a:rPr lang="de-DE" b="1" dirty="0"/>
+              <a:t>Includes</a:t>
+            </a:r>
+          </a:p>
+          <a:p>
+            <a:pPr>
+              <a:buFont typeface="Arial" panose="020B0604020202020204" pitchFamily="34" charset="0"/>
+              <a:buChar char="•"/>
+            </a:pPr>
+            <a:r>
+              <a:rPr lang="de-DE" dirty="0"/>
+              <a:t>Wiederverwendung von Variablen, Jobs, Job Templates, Defaults und ganzer Pipelines</a:t>
+            </a:r>
+          </a:p>
+          <a:p>
+            <a:pPr>
+              <a:buFont typeface="Arial" panose="020B0604020202020204" pitchFamily="34" charset="0"/>
+              <a:buChar char="•"/>
+            </a:pPr>
+            <a:r>
+              <a:rPr lang="de-DE" dirty="0"/>
+              <a:t>Über Projektgrenzen hinweg nutzbar</a:t>
+            </a:r>
+          </a:p>
+          <a:p>
+            <a:pPr>
+              <a:buFont typeface="Arial" panose="020B0604020202020204" pitchFamily="34" charset="0"/>
+              <a:buChar char="•"/>
+            </a:pPr>
+            <a:r>
+              <a:rPr lang="de-DE" dirty="0"/>
+              <a:t>Beispiel:</a:t>
+            </a:r>
+          </a:p>
+          <a:p>
+            <a:pPr>
+              <a:buFont typeface="Arial" panose="020B0604020202020204" pitchFamily="34" charset="0"/>
+              <a:buChar char="•"/>
+            </a:pPr>
+            <a:endParaRPr lang="de-DE" dirty="0"/>
+          </a:p>
+        </p:txBody>
+      </p:sp>
+      <p:sp>
+        <p:nvSpPr>
+          <p:cNvPr id="3" name="Textfeld 2">
+            <a:extLst>
+              <a:ext uri="{FF2B5EF4-FFF2-40B4-BE49-F238E27FC236}">
+                <a16:creationId xmlns:a16="http://schemas.microsoft.com/office/drawing/2014/main" id="{B1300DFB-F7A0-3AE1-8D8C-2D16867CB0F9}"/>
+              </a:ext>
+            </a:extLst>
+          </p:cNvPr>
+          <p:cNvSpPr txBox="1"/>
+          <p:nvPr/>
+        </p:nvSpPr>
+        <p:spPr bwMode="auto">
+          <a:xfrm>
+            <a:off x="323851" y="3356992"/>
+            <a:ext cx="8820149" cy="2308324"/>
+          </a:xfrm>
+          <a:prstGeom prst="rect">
+            <a:avLst/>
+          </a:prstGeom>
+          <a:noFill/>
+          <a:ln w="9525">
+            <a:noFill/>
+            <a:miter lim="800000"/>
+            <a:headEnd/>
+            <a:tailEnd/>
+          </a:ln>
+        </p:spPr>
+        <p:txBody>
+          <a:bodyPr wrap="square">
+            <a:spAutoFit/>
+          </a:bodyPr>
+          <a:lstStyle/>
+          <a:p>
+            <a:r>
+              <a:rPr lang="en-US" b="0" dirty="0">
+                <a:solidFill>
+                  <a:srgbClr val="800000"/>
+                </a:solidFill>
+                <a:effectLst/>
+                <a:highlight>
+                  <a:srgbClr val="FFFFFF"/>
+                </a:highlight>
+                <a:latin typeface="Consolas" panose="020B0609020204030204" pitchFamily="49" charset="0"/>
+              </a:rPr>
+              <a:t>include:</a:t>
+            </a:r>
+          </a:p>
+          <a:p>
+            <a:r>
+              <a:rPr lang="en-US" b="0" dirty="0">
+                <a:solidFill>
+                  <a:srgbClr val="800000"/>
+                </a:solidFill>
+                <a:effectLst/>
+                <a:highlight>
+                  <a:srgbClr val="FFFFFF"/>
+                </a:highlight>
+                <a:latin typeface="Consolas" panose="020B0609020204030204" pitchFamily="49" charset="0"/>
+              </a:rPr>
+              <a:t>  - </a:t>
+            </a:r>
+            <a:r>
+              <a:rPr lang="en-US" b="0" dirty="0">
+                <a:solidFill>
+                  <a:srgbClr val="0249FC"/>
+                </a:solidFill>
+                <a:effectLst/>
+                <a:highlight>
+                  <a:srgbClr val="FFFFFF"/>
+                </a:highlight>
+                <a:latin typeface="Consolas" panose="020B0609020204030204" pitchFamily="49" charset="0"/>
+              </a:rPr>
+              <a:t>'https://gitlab.com/</a:t>
+            </a:r>
+            <a:r>
+              <a:rPr lang="en-US" b="0" dirty="0" err="1">
+                <a:solidFill>
+                  <a:srgbClr val="0249FC"/>
+                </a:solidFill>
+                <a:effectLst/>
+                <a:highlight>
+                  <a:srgbClr val="FFFFFF"/>
+                </a:highlight>
+                <a:latin typeface="Consolas" panose="020B0609020204030204" pitchFamily="49" charset="0"/>
+              </a:rPr>
+              <a:t>myproj</a:t>
+            </a:r>
+            <a:r>
+              <a:rPr lang="en-US" b="0" dirty="0">
+                <a:solidFill>
+                  <a:srgbClr val="0249FC"/>
+                </a:solidFill>
+                <a:effectLst/>
+                <a:highlight>
+                  <a:srgbClr val="FFFFFF"/>
+                </a:highlight>
+                <a:latin typeface="Consolas" panose="020B0609020204030204" pitchFamily="49" charset="0"/>
+              </a:rPr>
+              <a:t>/raw/main/.</a:t>
+            </a:r>
+            <a:r>
+              <a:rPr lang="en-US" b="0" dirty="0" err="1">
+                <a:solidFill>
+                  <a:srgbClr val="0249FC"/>
+                </a:solidFill>
+                <a:effectLst/>
+                <a:highlight>
+                  <a:srgbClr val="FFFFFF"/>
+                </a:highlight>
+                <a:latin typeface="Consolas" panose="020B0609020204030204" pitchFamily="49" charset="0"/>
+              </a:rPr>
+              <a:t>tpl.yml</a:t>
+            </a:r>
+            <a:r>
+              <a:rPr lang="en-US" b="0" dirty="0">
+                <a:solidFill>
+                  <a:srgbClr val="0249FC"/>
+                </a:solidFill>
+                <a:effectLst/>
+                <a:highlight>
+                  <a:srgbClr val="FFFFFF"/>
+                </a:highlight>
+                <a:latin typeface="Consolas" panose="020B0609020204030204" pitchFamily="49" charset="0"/>
+              </a:rPr>
+              <a:t>'</a:t>
+            </a:r>
+          </a:p>
+          <a:p>
+            <a:r>
+              <a:rPr lang="en-US" b="0" dirty="0">
+                <a:solidFill>
+                  <a:srgbClr val="800000"/>
+                </a:solidFill>
+                <a:effectLst/>
+                <a:highlight>
+                  <a:srgbClr val="FFFFFF"/>
+                </a:highlight>
+                <a:latin typeface="Consolas" panose="020B0609020204030204" pitchFamily="49" charset="0"/>
+              </a:rPr>
+              <a:t>  - </a:t>
+            </a:r>
+            <a:r>
+              <a:rPr lang="en-US" b="0" dirty="0">
+                <a:solidFill>
+                  <a:srgbClr val="0249FC"/>
+                </a:solidFill>
+                <a:effectLst/>
+                <a:highlight>
+                  <a:srgbClr val="FFFFFF"/>
+                </a:highlight>
+                <a:latin typeface="Consolas" panose="020B0609020204030204" pitchFamily="49" charset="0"/>
+              </a:rPr>
+              <a:t>'templates/.before-</a:t>
+            </a:r>
+            <a:r>
+              <a:rPr lang="en-US" b="0" dirty="0" err="1">
+                <a:solidFill>
+                  <a:srgbClr val="0249FC"/>
+                </a:solidFill>
+                <a:effectLst/>
+                <a:highlight>
+                  <a:srgbClr val="FFFFFF"/>
+                </a:highlight>
+                <a:latin typeface="Consolas" panose="020B0609020204030204" pitchFamily="49" charset="0"/>
+              </a:rPr>
+              <a:t>script.yml</a:t>
+            </a:r>
+            <a:r>
+              <a:rPr lang="en-US" b="0" dirty="0">
+                <a:solidFill>
+                  <a:srgbClr val="0249FC"/>
+                </a:solidFill>
+                <a:effectLst/>
+                <a:highlight>
+                  <a:srgbClr val="FFFFFF"/>
+                </a:highlight>
+                <a:latin typeface="Consolas" panose="020B0609020204030204" pitchFamily="49" charset="0"/>
+              </a:rPr>
+              <a:t>'</a:t>
+            </a:r>
+          </a:p>
+          <a:p>
+            <a:r>
+              <a:rPr lang="en-US" b="0" dirty="0">
+                <a:solidFill>
+                  <a:srgbClr val="800000"/>
+                </a:solidFill>
+                <a:effectLst/>
+                <a:highlight>
+                  <a:srgbClr val="FFFFFF"/>
+                </a:highlight>
+                <a:latin typeface="Consolas" panose="020B0609020204030204" pitchFamily="49" charset="0"/>
+              </a:rPr>
+              <a:t>  - project: </a:t>
+            </a:r>
+            <a:r>
+              <a:rPr lang="en-US" b="0" dirty="0">
+                <a:solidFill>
+                  <a:srgbClr val="0249FC"/>
+                </a:solidFill>
+                <a:effectLst/>
+                <a:highlight>
+                  <a:srgbClr val="FFFFFF"/>
+                </a:highlight>
+                <a:latin typeface="Consolas" panose="020B0609020204030204" pitchFamily="49" charset="0"/>
+              </a:rPr>
+              <a:t>'</a:t>
+            </a:r>
+            <a:r>
+              <a:rPr lang="en-US" b="0" dirty="0" err="1">
+                <a:solidFill>
+                  <a:srgbClr val="0249FC"/>
+                </a:solidFill>
+                <a:effectLst/>
+                <a:highlight>
+                  <a:srgbClr val="FFFFFF"/>
+                </a:highlight>
+                <a:latin typeface="Consolas" panose="020B0609020204030204" pitchFamily="49" charset="0"/>
+              </a:rPr>
+              <a:t>pipepline</a:t>
+            </a:r>
+            <a:r>
+              <a:rPr lang="en-US" b="0" dirty="0">
+                <a:solidFill>
+                  <a:srgbClr val="0249FC"/>
+                </a:solidFill>
+                <a:effectLst/>
+                <a:highlight>
+                  <a:srgbClr val="FFFFFF"/>
+                </a:highlight>
+                <a:latin typeface="Consolas" panose="020B0609020204030204" pitchFamily="49" charset="0"/>
+              </a:rPr>
+              <a:t>-tools/</a:t>
+            </a:r>
+            <a:r>
+              <a:rPr lang="en-US" b="0" dirty="0" err="1">
+                <a:solidFill>
+                  <a:srgbClr val="0249FC"/>
+                </a:solidFill>
+                <a:effectLst/>
+                <a:highlight>
+                  <a:srgbClr val="FFFFFF"/>
+                </a:highlight>
+                <a:latin typeface="Consolas" panose="020B0609020204030204" pitchFamily="49" charset="0"/>
+              </a:rPr>
+              <a:t>gitlab</a:t>
+            </a:r>
+            <a:r>
+              <a:rPr lang="en-US" b="0" dirty="0">
+                <a:solidFill>
+                  <a:srgbClr val="0249FC"/>
+                </a:solidFill>
+                <a:effectLst/>
+                <a:highlight>
+                  <a:srgbClr val="FFFFFF"/>
+                </a:highlight>
+                <a:latin typeface="Consolas" panose="020B0609020204030204" pitchFamily="49" charset="0"/>
+              </a:rPr>
+              <a:t>-ci-includes'</a:t>
+            </a:r>
+          </a:p>
+          <a:p>
+            <a:r>
+              <a:rPr lang="en-US" b="0" dirty="0">
+                <a:solidFill>
+                  <a:srgbClr val="800000"/>
+                </a:solidFill>
+                <a:effectLst/>
+                <a:highlight>
+                  <a:srgbClr val="FFFFFF"/>
+                </a:highlight>
+                <a:latin typeface="Consolas" panose="020B0609020204030204" pitchFamily="49" charset="0"/>
+              </a:rPr>
+              <a:t>    ref: </a:t>
+            </a:r>
+            <a:r>
+              <a:rPr lang="en-US" b="0" dirty="0">
+                <a:solidFill>
+                  <a:srgbClr val="0249FC"/>
+                </a:solidFill>
+                <a:effectLst/>
+                <a:highlight>
+                  <a:srgbClr val="FFFFFF"/>
+                </a:highlight>
+                <a:latin typeface="Consolas" panose="020B0609020204030204" pitchFamily="49" charset="0"/>
+              </a:rPr>
+              <a:t>main</a:t>
+            </a:r>
+          </a:p>
+          <a:p>
+            <a:r>
+              <a:rPr lang="en-US" b="0" dirty="0">
+                <a:solidFill>
+                  <a:srgbClr val="800000"/>
+                </a:solidFill>
+                <a:effectLst/>
+                <a:highlight>
+                  <a:srgbClr val="FFFFFF"/>
+                </a:highlight>
+                <a:latin typeface="Consolas" panose="020B0609020204030204" pitchFamily="49" charset="0"/>
+              </a:rPr>
+              <a:t>    file: </a:t>
+            </a:r>
+            <a:r>
+              <a:rPr lang="en-US" b="0" dirty="0">
+                <a:solidFill>
+                  <a:srgbClr val="0249FC"/>
+                </a:solidFill>
+                <a:effectLst/>
+                <a:highlight>
+                  <a:srgbClr val="FFFFFF"/>
+                </a:highlight>
+                <a:latin typeface="Consolas" panose="020B0609020204030204" pitchFamily="49" charset="0"/>
+              </a:rPr>
+              <a:t>'templates/.ci-</a:t>
+            </a:r>
+            <a:r>
+              <a:rPr lang="en-US" b="0" dirty="0" err="1">
+                <a:solidFill>
+                  <a:srgbClr val="0249FC"/>
+                </a:solidFill>
+                <a:effectLst/>
+                <a:highlight>
+                  <a:srgbClr val="FFFFFF"/>
+                </a:highlight>
+                <a:latin typeface="Consolas" panose="020B0609020204030204" pitchFamily="49" charset="0"/>
+              </a:rPr>
+              <a:t>build.yml</a:t>
+            </a:r>
+            <a:r>
+              <a:rPr lang="en-US" b="0" dirty="0">
+                <a:solidFill>
+                  <a:srgbClr val="0249FC"/>
+                </a:solidFill>
+                <a:effectLst/>
+                <a:highlight>
+                  <a:srgbClr val="FFFFFF"/>
+                </a:highlight>
+                <a:latin typeface="Consolas" panose="020B0609020204030204" pitchFamily="49" charset="0"/>
+              </a:rPr>
+              <a:t>'</a:t>
+            </a:r>
+          </a:p>
+        </p:txBody>
+      </p:sp>
+    </p:spTree>
+    <p:extLst>
+      <p:ext uri="{BB962C8B-B14F-4D97-AF65-F5344CB8AC3E}">
+        <p14:creationId xmlns:p14="http://schemas.microsoft.com/office/powerpoint/2010/main" val="287164425"/>
+      </p:ext>
+    </p:extLst>
+  </p:cSld>
+  <p:clrMapOvr>
+    <a:masterClrMapping/>
+  </p:clrMapOvr>
+</p:sld>
+</file>
+
+<file path=ppt/slides/slide43.xml><?xml version="1.0" encoding="utf-8"?>
+<p:sld xmlns:a="http://schemas.openxmlformats.org/drawingml/2006/main" xmlns:r="http://schemas.openxmlformats.org/officeDocument/2006/relationships" xmlns:p="http://schemas.openxmlformats.org/presentationml/2006/main">
+  <p:cSld>
+    <p:spTree>
+      <p:nvGrpSpPr>
+        <p:cNvPr id="1" name=""/>
+        <p:cNvGrpSpPr/>
+        <p:nvPr/>
+      </p:nvGrpSpPr>
+      <p:grpSpPr>
+        <a:xfrm>
+          <a:off x="0" y="0"/>
+          <a:ext cx="0" cy="0"/>
+          <a:chOff x="0" y="0"/>
+          <a:chExt cx="0" cy="0"/>
+        </a:xfrm>
+      </p:grpSpPr>
+      <p:sp>
+        <p:nvSpPr>
+          <p:cNvPr id="2" name="Titel 1">
+            <a:extLst>
+              <a:ext uri="{FF2B5EF4-FFF2-40B4-BE49-F238E27FC236}">
+                <a16:creationId xmlns:a16="http://schemas.microsoft.com/office/drawing/2014/main" id="{3363B985-2812-BDBB-7E9D-A28D84AB06EF}"/>
+              </a:ext>
+            </a:extLst>
+          </p:cNvPr>
+          <p:cNvSpPr>
+            <a:spLocks noGrp="1"/>
+          </p:cNvSpPr>
+          <p:nvPr>
+            <p:ph type="title"/>
+          </p:nvPr>
+        </p:nvSpPr>
+        <p:spPr/>
+        <p:txBody>
+          <a:bodyPr/>
+          <a:lstStyle/>
+          <a:p>
+            <a:r>
+              <a:rPr lang="de-DE" dirty="0"/>
+              <a:t>CI/CD</a:t>
+            </a:r>
+          </a:p>
+        </p:txBody>
+      </p:sp>
+      <p:sp>
+        <p:nvSpPr>
+          <p:cNvPr id="4" name="Inhaltsplatzhalter 2">
+            <a:extLst>
+              <a:ext uri="{FF2B5EF4-FFF2-40B4-BE49-F238E27FC236}">
+                <a16:creationId xmlns:a16="http://schemas.microsoft.com/office/drawing/2014/main" id="{FE26268B-C609-ACA5-B6B4-D8D23D94F991}"/>
+              </a:ext>
+            </a:extLst>
+          </p:cNvPr>
+          <p:cNvSpPr>
+            <a:spLocks noGrp="1"/>
+          </p:cNvSpPr>
+          <p:nvPr>
+            <p:ph idx="1"/>
+          </p:nvPr>
+        </p:nvSpPr>
+        <p:spPr>
+          <a:xfrm>
+            <a:off x="303213" y="981075"/>
+            <a:ext cx="8516937" cy="5400675"/>
+          </a:xfrm>
+        </p:spPr>
+        <p:txBody>
+          <a:bodyPr/>
+          <a:lstStyle/>
+          <a:p>
+            <a:pPr marL="0" indent="0">
+              <a:buNone/>
+            </a:pPr>
+            <a:r>
+              <a:rPr lang="de-DE" b="1" dirty="0" err="1"/>
+              <a:t>Scheduled</a:t>
+            </a:r>
+            <a:r>
+              <a:rPr lang="de-DE" b="1" dirty="0"/>
+              <a:t> Pipelines</a:t>
+            </a:r>
+            <a:endParaRPr lang="de-DE" dirty="0"/>
+          </a:p>
+          <a:p>
+            <a:pPr>
+              <a:buFont typeface="Arial" panose="020B0604020202020204" pitchFamily="34" charset="0"/>
+              <a:buChar char="•"/>
+            </a:pPr>
+            <a:r>
+              <a:rPr lang="de-DE" dirty="0"/>
+              <a:t>Automatische Ausführung zu vorgegebenen Zeiten</a:t>
+            </a:r>
+          </a:p>
+          <a:p>
+            <a:pPr>
+              <a:buFont typeface="Arial" panose="020B0604020202020204" pitchFamily="34" charset="0"/>
+              <a:buChar char="•"/>
+            </a:pPr>
+            <a:r>
+              <a:rPr lang="de-DE" dirty="0"/>
+              <a:t>Manuelles Anstoßen ebenfalls möglich</a:t>
+            </a:r>
+          </a:p>
+          <a:p>
+            <a:pPr>
+              <a:buFont typeface="Arial" panose="020B0604020202020204" pitchFamily="34" charset="0"/>
+              <a:buChar char="•"/>
+            </a:pPr>
+            <a:r>
+              <a:rPr lang="de-DE" dirty="0"/>
+              <a:t>Konfiguration über </a:t>
+            </a:r>
+            <a:r>
+              <a:rPr lang="de-DE" dirty="0" err="1"/>
+              <a:t>GitLab</a:t>
+            </a:r>
+            <a:r>
+              <a:rPr lang="de-DE" dirty="0"/>
+              <a:t> GUI (erfordert </a:t>
+            </a:r>
+            <a:r>
+              <a:rPr lang="de-DE" dirty="0" err="1"/>
+              <a:t>Owner</a:t>
+            </a:r>
+            <a:r>
+              <a:rPr lang="de-DE" dirty="0"/>
+              <a:t>-Rechte)</a:t>
+            </a:r>
+          </a:p>
+          <a:p>
+            <a:pPr>
+              <a:buFont typeface="Arial" panose="020B0604020202020204" pitchFamily="34" charset="0"/>
+              <a:buChar char="•"/>
+            </a:pPr>
+            <a:endParaRPr lang="de-DE" dirty="0"/>
+          </a:p>
+        </p:txBody>
+      </p:sp>
+    </p:spTree>
+    <p:extLst>
+      <p:ext uri="{BB962C8B-B14F-4D97-AF65-F5344CB8AC3E}">
+        <p14:creationId xmlns:p14="http://schemas.microsoft.com/office/powerpoint/2010/main" val="1118458735"/>
+      </p:ext>
+    </p:extLst>
+  </p:cSld>
+  <p:clrMapOvr>
+    <a:masterClrMapping/>
+  </p:clrMapOvr>
+</p:sld>
+</file>
+
+<file path=ppt/slides/slide44.xml><?xml version="1.0" encoding="utf-8"?>
 <p:sld xmlns:a="http://schemas.openxmlformats.org/drawingml/2006/main" xmlns:r="http://schemas.openxmlformats.org/officeDocument/2006/relationships" xmlns:p="http://schemas.openxmlformats.org/presentationml/2006/main">
   <p:cSld>
     <p:spTree>
@@ -21111,7 +23440,7 @@
 </p:sld>
 </file>
 
-<file path=ppt/slides/slide41.xml><?xml version="1.0" encoding="utf-8"?>
+<file path=ppt/slides/slide45.xml><?xml version="1.0" encoding="utf-8"?>
 <p:sld xmlns:a="http://schemas.openxmlformats.org/drawingml/2006/main" xmlns:r="http://schemas.openxmlformats.org/officeDocument/2006/relationships" xmlns:p="http://schemas.openxmlformats.org/presentationml/2006/main">
   <p:cSld>
     <p:spTree>
@@ -21187,7 +23516,7 @@
             </a:pPr>
             <a:r>
               <a:rPr lang="de-DE" b="1" dirty="0"/>
-              <a:t>Aufgabe 6: Bedingte Ausführung von Jobs</a:t>
+              <a:t>Aufgabe 8: Bedingte Ausführung von Jobs</a:t>
             </a:r>
             <a:endParaRPr lang="de-DE" dirty="0"/>
           </a:p>
@@ -21267,7 +23596,7 @@
 </p:sld>
 </file>
 
-<file path=ppt/slides/slide42.xml><?xml version="1.0" encoding="utf-8"?>
+<file path=ppt/slides/slide46.xml><?xml version="1.0" encoding="utf-8"?>
 <p:sld xmlns:a="http://schemas.openxmlformats.org/drawingml/2006/main" xmlns:r="http://schemas.openxmlformats.org/officeDocument/2006/relationships" xmlns:p="http://schemas.openxmlformats.org/presentationml/2006/main">
   <p:cSld>
     <p:spTree>
@@ -21343,7 +23672,7 @@
             </a:pPr>
             <a:r>
               <a:rPr lang="de-DE" b="1" dirty="0"/>
-              <a:t>Aufgabe 6: Bedingte Ausführung von Jobs</a:t>
+              <a:t>Aufgabe 8: Bedingte Ausführung von Jobs</a:t>
             </a:r>
             <a:endParaRPr lang="de-DE" dirty="0"/>
           </a:p>
@@ -22827,7 +25156,7 @@
 </p:sld>
 </file>
 
-<file path=ppt/slides/slide43.xml><?xml version="1.0" encoding="utf-8"?>
+<file path=ppt/slides/slide47.xml><?xml version="1.0" encoding="utf-8"?>
 <p:sld xmlns:a="http://schemas.openxmlformats.org/drawingml/2006/main" xmlns:r="http://schemas.openxmlformats.org/officeDocument/2006/relationships" xmlns:p="http://schemas.openxmlformats.org/presentationml/2006/main">
   <p:cSld>
     <p:spTree>
@@ -22903,7 +25232,7 @@
             </a:pPr>
             <a:r>
               <a:rPr lang="de-DE" b="1" dirty="0"/>
-              <a:t>Aufgabe 7: Parallelisierung von Jobs</a:t>
+              <a:t>Aufgabe 9: Parallelisierung von Jobs</a:t>
             </a:r>
             <a:endParaRPr lang="de-DE" dirty="0"/>
           </a:p>
@@ -22974,7 +25303,7 @@
 </p:sld>
 </file>
 
-<file path=ppt/slides/slide44.xml><?xml version="1.0" encoding="utf-8"?>
+<file path=ppt/slides/slide48.xml><?xml version="1.0" encoding="utf-8"?>
 <p:sld xmlns:a="http://schemas.openxmlformats.org/drawingml/2006/main" xmlns:r="http://schemas.openxmlformats.org/officeDocument/2006/relationships" xmlns:p="http://schemas.openxmlformats.org/presentationml/2006/main">
   <p:cSld>
     <p:spTree>
@@ -23050,7 +25379,7 @@
             </a:pPr>
             <a:r>
               <a:rPr lang="de-DE" b="1" dirty="0"/>
-              <a:t>Aufgabe 7: Parallelisierung von Jobs</a:t>
+              <a:t>Aufgabe 9: Parallelisierung von Jobs</a:t>
             </a:r>
             <a:endParaRPr lang="de-DE" dirty="0"/>
           </a:p>

</xml_diff>

<commit_message>
Verbesserungen der Struktur von Gitlab CI/CD aufgaben
</commit_message>
<xml_diff>
--- a/slides/Tag-2_4-CI_CD.pptx
+++ b/slides/Tag-2_4-CI_CD.pptx
@@ -4555,7 +4555,7 @@
               <a:pPr algn="ctr">
                 <a:defRPr/>
               </a:pPr>
-              <a:t>29.07.2024</a:t>
+              <a:t>08.08.2024</a:t>
             </a:fld>
             <a:endParaRPr lang="de-DE" sz="1000">
               <a:solidFill>
@@ -11643,6 +11643,9 @@
               <a:rPr lang="de-DE" b="1" dirty="0"/>
               <a:t> CI/CD</a:t>
             </a:r>
+            <a:br>
+              <a:rPr lang="de-DE" b="1" dirty="0"/>
+            </a:br>
             <a:endParaRPr lang="de-DE" dirty="0"/>
           </a:p>
           <a:p>
@@ -11656,7 +11659,14 @@
             </a:r>
             <a:r>
               <a:rPr lang="de-DE" dirty="0"/>
-              <a:t>: Verstehe die Grundlagen von </a:t>
+              <a:t>: </a:t>
+            </a:r>
+            <a:br>
+              <a:rPr lang="de-DE" dirty="0"/>
+            </a:br>
+            <a:r>
+              <a:rPr lang="de-DE" dirty="0"/>
+              <a:t>Grundlagen von </a:t>
             </a:r>
             <a:r>
               <a:rPr lang="de-DE" dirty="0" err="1"/>
@@ -11672,6 +11682,13 @@
               <a:buFont typeface="+mj-lt"/>
               <a:buAutoNum type="arabicPeriod"/>
             </a:pPr>
+            <a:endParaRPr lang="de-DE" dirty="0"/>
+          </a:p>
+          <a:p>
+            <a:pPr marL="457200" indent="-457200">
+              <a:buFont typeface="+mj-lt"/>
+              <a:buAutoNum type="arabicPeriod"/>
+            </a:pPr>
             <a:r>
               <a:rPr lang="de-DE" b="1" dirty="0"/>
               <a:t>Schritte</a:t>
@@ -11687,15 +11704,15 @@
               <a:buChar char="•"/>
             </a:pPr>
             <a:r>
-              <a:rPr lang="de-DE" dirty="0"/>
-              <a:t>Erstelle ein neues </a:t>
-            </a:r>
-            <a:r>
-              <a:rPr lang="de-DE" dirty="0" err="1"/>
+              <a:rPr lang="de-DE" sz="2400" dirty="0"/>
+              <a:t>Erstellen Sie ein neues </a:t>
+            </a:r>
+            <a:r>
+              <a:rPr lang="de-DE" sz="2400" dirty="0" err="1"/>
               <a:t>GitLab</a:t>
             </a:r>
             <a:r>
-              <a:rPr lang="de-DE" dirty="0"/>
+              <a:rPr lang="de-DE" sz="2400" dirty="0"/>
               <a:t>-Repository</a:t>
             </a:r>
           </a:p>
@@ -11705,23 +11722,23 @@
               <a:buChar char="•"/>
             </a:pPr>
             <a:r>
-              <a:rPr lang="de-DE" dirty="0"/>
-              <a:t>Füge eine .</a:t>
-            </a:r>
-            <a:r>
-              <a:rPr lang="de-DE" dirty="0" err="1"/>
+              <a:rPr lang="de-DE" sz="2400" dirty="0"/>
+              <a:t>Fügen Sie eine .</a:t>
+            </a:r>
+            <a:r>
+              <a:rPr lang="de-DE" sz="2400" dirty="0" err="1"/>
               <a:t>gitlab</a:t>
             </a:r>
             <a:r>
-              <a:rPr lang="de-DE" dirty="0"/>
+              <a:rPr lang="de-DE" sz="2400" dirty="0"/>
               <a:t>-</a:t>
             </a:r>
             <a:r>
-              <a:rPr lang="de-DE" dirty="0" err="1"/>
+              <a:rPr lang="de-DE" sz="2400" dirty="0" err="1"/>
               <a:t>ci.yml</a:t>
             </a:r>
             <a:r>
-              <a:rPr lang="de-DE" dirty="0"/>
+              <a:rPr lang="de-DE" sz="2400" dirty="0"/>
               <a:t>-Datei im Stammverzeichnis des Projekts hinzu</a:t>
             </a:r>
           </a:p>
@@ -11731,15 +11748,15 @@
               <a:buChar char="•"/>
             </a:pPr>
             <a:r>
-              <a:rPr lang="de-DE" dirty="0"/>
-              <a:t>Schreibe eine einfache Konfiguration, die einen Job namens </a:t>
-            </a:r>
-            <a:r>
-              <a:rPr lang="de-DE" dirty="0" err="1"/>
+              <a:rPr lang="de-DE" sz="2400" dirty="0"/>
+              <a:t>Schreiben Sie eine einfache Konfiguration, die einen Job namens </a:t>
+            </a:r>
+            <a:r>
+              <a:rPr lang="de-DE" sz="2400" dirty="0" err="1"/>
               <a:t>hello_world</a:t>
             </a:r>
             <a:r>
-              <a:rPr lang="de-DE" dirty="0"/>
+              <a:rPr lang="de-DE" sz="2400" dirty="0"/>
               <a:t> definiert, der "Hello, World!" ausgibt</a:t>
             </a:r>
           </a:p>
@@ -12660,6 +12677,11 @@
               <a:rPr lang="de-DE" b="1" dirty="0"/>
               <a:t>Aufgabe 2: Verwendung von Stages</a:t>
             </a:r>
+          </a:p>
+          <a:p>
+            <a:pPr marL="0" indent="0">
+              <a:buNone/>
+            </a:pPr>
             <a:endParaRPr lang="de-DE" dirty="0"/>
           </a:p>
           <a:p>
@@ -12673,16 +12695,19 @@
             </a:r>
             <a:r>
               <a:rPr lang="de-DE" dirty="0"/>
-              <a:t>: Verstehe, wie Stages in </a:t>
-            </a:r>
-            <a:r>
-              <a:rPr lang="de-DE" dirty="0" err="1"/>
-              <a:t>GitLab</a:t>
-            </a:r>
-            <a:r>
+              <a:t>: </a:t>
+            </a:r>
+            <a:br>
               <a:rPr lang="de-DE" dirty="0"/>
-              <a:t> CI funktionieren und wie sie zur Strukturierung von Jobs verwendet werden</a:t>
-            </a:r>
+            </a:br>
+            <a:r>
+              <a:rPr lang="de-DE" dirty="0"/>
+              <a:t>Die CI/CD-Pipeline mit Stages strukturieren</a:t>
+            </a:r>
+            <a:br>
+              <a:rPr lang="de-DE" dirty="0"/>
+            </a:br>
+            <a:endParaRPr lang="de-DE" dirty="0"/>
           </a:p>
           <a:p>
             <a:pPr marL="457200" indent="-457200">
@@ -12704,31 +12729,35 @@
               <a:buChar char="•"/>
             </a:pPr>
             <a:r>
-              <a:rPr lang="de-DE" dirty="0"/>
-              <a:t>Erweitere die .</a:t>
-            </a:r>
-            <a:r>
-              <a:rPr lang="de-DE" dirty="0" err="1"/>
+              <a:rPr lang="de-DE" sz="2400" dirty="0" err="1"/>
+              <a:t>Erweiteren</a:t>
+            </a:r>
+            <a:r>
+              <a:rPr lang="de-DE" sz="2400" dirty="0"/>
+              <a:t> Sie die .</a:t>
+            </a:r>
+            <a:r>
+              <a:rPr lang="de-DE" sz="2400" dirty="0" err="1"/>
               <a:t>gitlab-ci.yml</a:t>
             </a:r>
             <a:r>
-              <a:rPr lang="de-DE" dirty="0"/>
+              <a:rPr lang="de-DE" sz="2400" dirty="0"/>
               <a:t>, um zwei Stages (</a:t>
             </a:r>
             <a:r>
-              <a:rPr lang="de-DE" dirty="0" err="1"/>
+              <a:rPr lang="de-DE" sz="2400" dirty="0" err="1"/>
               <a:t>build</a:t>
             </a:r>
             <a:r>
-              <a:rPr lang="de-DE" dirty="0"/>
+              <a:rPr lang="de-DE" sz="2400" dirty="0"/>
               <a:t> und </a:t>
             </a:r>
             <a:r>
-              <a:rPr lang="de-DE" dirty="0" err="1"/>
+              <a:rPr lang="de-DE" sz="2400" dirty="0" err="1"/>
               <a:t>test</a:t>
             </a:r>
             <a:r>
-              <a:rPr lang="de-DE" dirty="0"/>
+              <a:rPr lang="de-DE" sz="2400" dirty="0"/>
               <a:t>) zu definieren</a:t>
             </a:r>
           </a:p>
@@ -12738,15 +12767,15 @@
               <a:buChar char="•"/>
             </a:pPr>
             <a:r>
-              <a:rPr lang="de-DE" dirty="0"/>
-              <a:t>Füge einen Job in der </a:t>
-            </a:r>
-            <a:r>
-              <a:rPr lang="de-DE" dirty="0" err="1"/>
+              <a:rPr lang="de-DE" sz="2400" dirty="0"/>
+              <a:t>Fügen Sie einen Job in der </a:t>
+            </a:r>
+            <a:r>
+              <a:rPr lang="de-DE" sz="2400" dirty="0" err="1"/>
               <a:t>build</a:t>
             </a:r>
             <a:r>
-              <a:rPr lang="de-DE" dirty="0"/>
+              <a:rPr lang="de-DE" sz="2400" dirty="0"/>
               <a:t>-Stage hinzu, der eine Dummy-Datei erstellt</a:t>
             </a:r>
           </a:p>
@@ -12756,8 +12785,8 @@
               <a:buChar char="•"/>
             </a:pPr>
             <a:r>
-              <a:rPr lang="de-DE" dirty="0"/>
-              <a:t>Füge einen Job in der test-Stage hinzu, welcher das Vorhandensein der Datei überprüft</a:t>
+              <a:rPr lang="de-DE" sz="2400" dirty="0"/>
+              <a:t>Fügen Sie einen Job in der test-Stage hinzu, welcher das Vorhandensein der Datei überprüft</a:t>
             </a:r>
           </a:p>
           <a:p>
@@ -13564,6 +13593,9 @@
               <a:rPr lang="de-DE" b="1" dirty="0" err="1"/>
               <a:t>Artifacts</a:t>
             </a:r>
+            <a:br>
+              <a:rPr lang="de-DE" b="1" dirty="0"/>
+            </a:br>
             <a:endParaRPr lang="de-DE" dirty="0"/>
           </a:p>
           <a:p>
@@ -13577,16 +13609,23 @@
             </a:r>
             <a:r>
               <a:rPr lang="de-DE" dirty="0"/>
-              <a:t>: Verstehe, wie man </a:t>
+              <a:t>: </a:t>
+            </a:r>
+            <a:br>
+              <a:rPr lang="de-DE" dirty="0"/>
+            </a:br>
+            <a:r>
+              <a:rPr lang="de-DE" dirty="0"/>
+              <a:t>Dateien zwischen Jobs und Stages mittels </a:t>
             </a:r>
             <a:r>
               <a:rPr lang="de-DE" dirty="0" err="1"/>
               <a:t>Artifacts</a:t>
             </a:r>
-            <a:r>
+            <a:br>
               <a:rPr lang="de-DE" dirty="0"/>
-              <a:t> verwendet, um Dateien zwischen Jobs und Stages zu teilen</a:t>
-            </a:r>
+            </a:br>
+            <a:endParaRPr lang="de-DE" dirty="0"/>
           </a:p>
           <a:p>
             <a:pPr marL="457200" indent="-457200">
@@ -13608,23 +13647,23 @@
               <a:buChar char="•"/>
             </a:pPr>
             <a:r>
-              <a:rPr lang="de-DE" dirty="0"/>
-              <a:t>Modifiziere den </a:t>
-            </a:r>
-            <a:r>
-              <a:rPr lang="de-DE" dirty="0" err="1"/>
+              <a:rPr lang="de-DE" sz="2400" dirty="0"/>
+              <a:t>Modifizieren Sie den </a:t>
+            </a:r>
+            <a:r>
+              <a:rPr lang="de-DE" sz="2400" dirty="0" err="1"/>
               <a:t>build_job</a:t>
             </a:r>
             <a:r>
-              <a:rPr lang="de-DE" dirty="0"/>
+              <a:rPr lang="de-DE" sz="2400" dirty="0"/>
               <a:t>, um die dummy_file.txt als </a:t>
             </a:r>
             <a:r>
-              <a:rPr lang="de-DE" dirty="0" err="1"/>
+              <a:rPr lang="de-DE" sz="2400" dirty="0" err="1"/>
               <a:t>Artifact</a:t>
             </a:r>
             <a:r>
-              <a:rPr lang="de-DE" dirty="0"/>
+              <a:rPr lang="de-DE" sz="2400" dirty="0"/>
               <a:t> zu speichern</a:t>
             </a:r>
           </a:p>
@@ -13634,23 +13673,27 @@
               <a:buChar char="•"/>
             </a:pPr>
             <a:r>
-              <a:rPr lang="de-DE" dirty="0"/>
-              <a:t>Ändere den </a:t>
-            </a:r>
-            <a:r>
-              <a:rPr lang="de-DE" dirty="0" err="1"/>
+              <a:rPr lang="de-DE" sz="2400" dirty="0" err="1"/>
+              <a:t>Änderen</a:t>
+            </a:r>
+            <a:r>
+              <a:rPr lang="de-DE" sz="2400" dirty="0"/>
+              <a:t> Sie den </a:t>
+            </a:r>
+            <a:r>
+              <a:rPr lang="de-DE" sz="2400" dirty="0" err="1"/>
               <a:t>test_job</a:t>
             </a:r>
             <a:r>
-              <a:rPr lang="de-DE" dirty="0"/>
+              <a:rPr lang="de-DE" sz="2400" dirty="0"/>
               <a:t>, um dieses </a:t>
             </a:r>
             <a:r>
-              <a:rPr lang="de-DE" dirty="0" err="1"/>
+              <a:rPr lang="de-DE" sz="2400" dirty="0" err="1"/>
               <a:t>Artifact</a:t>
             </a:r>
             <a:r>
-              <a:rPr lang="de-DE" dirty="0"/>
+              <a:rPr lang="de-DE" sz="2400" dirty="0"/>
               <a:t> zu verwenden</a:t>
             </a:r>
           </a:p>
@@ -16012,6 +16055,9 @@
               <a:rPr lang="de-DE" b="1" dirty="0"/>
               <a:t>Aufgabe 4: Erweiterung mit einem Deploy-Job</a:t>
             </a:r>
+            <a:br>
+              <a:rPr lang="de-DE" b="1" dirty="0"/>
+            </a:br>
             <a:endParaRPr lang="de-DE" dirty="0"/>
           </a:p>
           <a:p>
@@ -16025,15 +16071,14 @@
             </a:r>
             <a:r>
               <a:rPr lang="de-DE" dirty="0"/>
-              <a:t>: Lerne, wie man einen </a:t>
-            </a:r>
-            <a:r>
-              <a:rPr lang="de-DE" dirty="0" err="1"/>
-              <a:t>Deployment</a:t>
-            </a:r>
-            <a:r>
+              <a:t>: </a:t>
+            </a:r>
+            <a:br>
               <a:rPr lang="de-DE" dirty="0"/>
-              <a:t>-Job hinzufügt und </a:t>
+            </a:br>
+            <a:r>
+              <a:rPr lang="de-DE" dirty="0"/>
+              <a:t>Einen Job hinzufügen und </a:t>
             </a:r>
             <a:r>
               <a:rPr lang="de-DE" dirty="0" err="1"/>
@@ -16041,16 +16086,12 @@
             </a:r>
             <a:r>
               <a:rPr lang="de-DE" dirty="0"/>
-              <a:t> verwendet, um </a:t>
-            </a:r>
-            <a:r>
-              <a:rPr lang="de-DE" dirty="0" err="1"/>
-              <a:t>Build</a:t>
-            </a:r>
-            <a:r>
+              <a:t> verwenden und diese zu Deployen</a:t>
+            </a:r>
+            <a:br>
               <a:rPr lang="de-DE" dirty="0"/>
-              <a:t>-Artefakte zu deployen</a:t>
-            </a:r>
+            </a:br>
+            <a:endParaRPr lang="de-DE" dirty="0"/>
           </a:p>
           <a:p>
             <a:pPr marL="457200" indent="-457200">
@@ -16072,7 +16113,7 @@
               <a:buChar char="•"/>
             </a:pPr>
             <a:r>
-              <a:rPr lang="de-DE" dirty="0"/>
+              <a:rPr lang="de-DE" sz="2400" dirty="0"/>
               <a:t>Füge eine deploy-Stage hinzu</a:t>
             </a:r>
           </a:p>
@@ -16082,31 +16123,31 @@
               <a:buChar char="•"/>
             </a:pPr>
             <a:r>
-              <a:rPr lang="de-DE" dirty="0"/>
+              <a:rPr lang="de-DE" sz="2400" dirty="0"/>
               <a:t>Erstelle einen </a:t>
             </a:r>
             <a:r>
-              <a:rPr lang="de-DE" dirty="0" err="1"/>
+              <a:rPr lang="de-DE" sz="2400" dirty="0" err="1"/>
               <a:t>deploy_job</a:t>
             </a:r>
             <a:r>
-              <a:rPr lang="de-DE" dirty="0"/>
+              <a:rPr lang="de-DE" sz="2400" dirty="0"/>
               <a:t>, der das </a:t>
             </a:r>
             <a:r>
-              <a:rPr lang="de-DE" dirty="0" err="1"/>
+              <a:rPr lang="de-DE" sz="2400" dirty="0" err="1"/>
               <a:t>Artifact</a:t>
             </a:r>
             <a:r>
-              <a:rPr lang="de-DE" dirty="0"/>
+              <a:rPr lang="de-DE" sz="2400" dirty="0"/>
               <a:t> herunterlädt und einen simulierten </a:t>
             </a:r>
             <a:r>
-              <a:rPr lang="de-DE" dirty="0" err="1"/>
+              <a:rPr lang="de-DE" sz="2400" dirty="0" err="1"/>
               <a:t>Deployment</a:t>
             </a:r>
             <a:r>
-              <a:rPr lang="de-DE" dirty="0"/>
+              <a:rPr lang="de-DE" sz="2400" dirty="0"/>
               <a:t>-Prozess ausführt</a:t>
             </a:r>
           </a:p>
@@ -17959,6 +18000,9 @@
               <a:rPr lang="de-DE" b="1" dirty="0"/>
               <a:t>Aufgabe 5: Einführung von Variablen</a:t>
             </a:r>
+            <a:br>
+              <a:rPr lang="de-DE" b="1" dirty="0"/>
+            </a:br>
             <a:endParaRPr lang="de-DE" dirty="0"/>
           </a:p>
           <a:p>
@@ -17971,29 +18015,36 @@
             </a:r>
             <a:r>
               <a:rPr lang="de-DE" dirty="0"/>
-              <a:t>: Lerne, </a:t>
-            </a:r>
-            <a:r>
+              <a:t>: </a:t>
+            </a:r>
+            <a:br>
+              <a:rPr lang="de-DE" dirty="0"/>
+            </a:br>
+            <a:r>
+              <a:rPr lang="de-DE" dirty="0"/>
+              <a:t>Die CI/CD </a:t>
+            </a:r>
+            <a:r>
+              <a:rPr lang="de-DE" dirty="0" err="1"/>
+              <a:t>Pipiline</a:t>
+            </a:r>
+            <a:r>
+              <a:rPr lang="de-DE" dirty="0"/>
+              <a:t> Flexibler zu gestalten,</a:t>
+            </a:r>
+            <a:br>
+              <a:rPr lang="de-DE" dirty="0"/>
+            </a:br>
+            <a:r>
+              <a:rPr lang="de-DE" dirty="0"/>
+              <a:t>mit Verwendung von Variablen</a:t>
+            </a:r>
+            <a:br>
               <a:rPr lang="de-DE" dirty="0">
                 <a:ea typeface="+mn-lt"/>
                 <a:cs typeface="+mn-lt"/>
               </a:rPr>
-              <a:t>wie man Variablen in </a:t>
-            </a:r>
-            <a:r>
-              <a:rPr lang="de-DE" dirty="0" err="1">
-                <a:ea typeface="+mn-lt"/>
-                <a:cs typeface="+mn-lt"/>
-              </a:rPr>
-              <a:t>GitLab</a:t>
-            </a:r>
-            <a:r>
-              <a:rPr lang="de-DE" dirty="0">
-                <a:ea typeface="+mn-lt"/>
-                <a:cs typeface="+mn-lt"/>
-              </a:rPr>
-              <a:t> CI/CD Pipelines verwenden kann, um den Entwicklungsprozess flexibler zu gestalten und die Wartbarkeit des Codes zu verbessern.</a:t>
-            </a:r>
+            </a:br>
             <a:endParaRPr lang="de-DE" dirty="0">
               <a:cs typeface="Arial"/>
             </a:endParaRPr>
@@ -18018,10 +18069,10 @@
               <a:buChar char="•"/>
             </a:pPr>
             <a:r>
-              <a:rPr lang="de-DE" dirty="0"/>
-              <a:t>Füge eine Variable DUMMY_FILE hinzu</a:t>
-            </a:r>
-            <a:endParaRPr lang="de-DE" dirty="0">
+              <a:rPr lang="de-DE" sz="2400" dirty="0"/>
+              <a:t>Fügen Sie eine Variable DUMMY_FILE hinzu</a:t>
+            </a:r>
+            <a:endParaRPr lang="de-DE" sz="2400" dirty="0">
               <a:cs typeface="Arial"/>
             </a:endParaRPr>
           </a:p>
@@ -18031,10 +18082,10 @@
               <a:buChar char="•"/>
             </a:pPr>
             <a:r>
-              <a:rPr lang="de-DE" dirty="0">
+              <a:rPr lang="de-DE" sz="2400" dirty="0">
                 <a:cs typeface="Arial"/>
               </a:rPr>
-              <a:t>Ersetze alle Verweise auf "dummy_file.txt" mit der Variable</a:t>
+              <a:t>Ersetzen Sie alle Verweise auf "dummy_file.txt" mit der Variable</a:t>
             </a:r>
           </a:p>
           <a:p>
@@ -20155,6 +20206,9 @@
               <a:rPr lang="de-DE" b="1" dirty="0"/>
               <a:t>Aufgabe 6: Einführung von Defaults</a:t>
             </a:r>
+            <a:br>
+              <a:rPr lang="de-DE" b="1" dirty="0"/>
+            </a:br>
             <a:endParaRPr lang="de-DE" dirty="0"/>
           </a:p>
           <a:p>
@@ -20167,29 +20221,33 @@
             </a:r>
             <a:r>
               <a:rPr lang="de-DE" dirty="0"/>
-              <a:t>: Lerne, </a:t>
-            </a:r>
-            <a:r>
-              <a:rPr lang="de-DE" dirty="0">
-                <a:ea typeface="+mn-lt"/>
-                <a:cs typeface="+mn-lt"/>
-              </a:rPr>
-              <a:t>wie man Defaults in </a:t>
-            </a:r>
-            <a:r>
-              <a:rPr lang="de-DE" dirty="0" err="1">
-                <a:ea typeface="+mn-lt"/>
-                <a:cs typeface="+mn-lt"/>
-              </a:rPr>
-              <a:t>GitLab</a:t>
-            </a:r>
-            <a:r>
-              <a:rPr lang="de-DE" dirty="0">
-                <a:ea typeface="+mn-lt"/>
-                <a:cs typeface="+mn-lt"/>
-              </a:rPr>
-              <a:t> CI/CD Pipelines verwenden kann, um den Aufbau des Codes zu vereinfachen und die Wartbarkeit des Codes zu verbessern.</a:t>
-            </a:r>
+              <a:t>: </a:t>
+            </a:r>
+            <a:br>
+              <a:rPr lang="de-DE" dirty="0"/>
+            </a:br>
+            <a:r>
+              <a:rPr lang="de-DE" dirty="0"/>
+              <a:t>Vereinfachung des </a:t>
+            </a:r>
+            <a:r>
+              <a:rPr lang="de-DE" dirty="0" err="1"/>
+              <a:t>Gitlab</a:t>
+            </a:r>
+            <a:r>
+              <a:rPr lang="de-DE" dirty="0"/>
+              <a:t>-CI Codes</a:t>
+            </a:r>
+            <a:br>
+              <a:rPr lang="de-DE" dirty="0"/>
+            </a:br>
+            <a:r>
+              <a:rPr lang="de-DE" dirty="0"/>
+              <a:t>mit Verwendung von Defaults</a:t>
+            </a:r>
+            <a:br>
+              <a:rPr lang="de-DE" dirty="0"/>
+            </a:br>
             <a:endParaRPr lang="de-DE" dirty="0">
               <a:cs typeface="Arial"/>
             </a:endParaRPr>
@@ -20214,31 +20272,31 @@
               <a:buChar char="•"/>
             </a:pPr>
             <a:r>
-              <a:rPr lang="de-DE" dirty="0">
+              <a:rPr lang="de-DE" sz="2400" dirty="0">
                 <a:cs typeface="Arial"/>
               </a:rPr>
-              <a:t>Setze die </a:t>
-            </a:r>
-            <a:r>
-              <a:rPr lang="de-DE" dirty="0" err="1">
+              <a:t>Setzen Sie die </a:t>
+            </a:r>
+            <a:r>
+              <a:rPr lang="de-DE" sz="2400" dirty="0" err="1">
                 <a:cs typeface="Arial"/>
               </a:rPr>
               <a:t>default</a:t>
             </a:r>
             <a:r>
-              <a:rPr lang="de-DE" dirty="0">
+              <a:rPr lang="de-DE" sz="2400" dirty="0">
                 <a:cs typeface="Arial"/>
               </a:rPr>
-              <a:t> Stage auf "</a:t>
-            </a:r>
-            <a:r>
-              <a:rPr lang="de-DE" dirty="0" err="1">
+              <a:t> Stage (Folie 35) auf "</a:t>
+            </a:r>
+            <a:r>
+              <a:rPr lang="de-DE" sz="2400" dirty="0" err="1">
                 <a:cs typeface="Arial"/>
               </a:rPr>
               <a:t>build</a:t>
             </a:r>
             <a:r>
-              <a:rPr lang="de-DE" dirty="0">
+              <a:rPr lang="de-DE" sz="2400" dirty="0">
                 <a:cs typeface="Arial"/>
               </a:rPr>
               <a:t>"</a:t>
@@ -20250,10 +20308,10 @@
               <a:buChar char="•"/>
             </a:pPr>
             <a:r>
-              <a:rPr lang="de-DE" dirty="0">
+              <a:rPr lang="de-DE" sz="2400" dirty="0">
                 <a:cs typeface="Arial"/>
               </a:rPr>
-              <a:t>Entferne die überflüssigen Stage Zuweisungen</a:t>
+              <a:t>Entfernen Sie die überflüssigen Stage Zuweisungen</a:t>
             </a:r>
           </a:p>
           <a:p>
@@ -21727,6 +21785,9 @@
               <a:rPr lang="de-DE" b="1" dirty="0" err="1"/>
               <a:t>Extensions</a:t>
             </a:r>
+            <a:br>
+              <a:rPr lang="de-DE" b="1" dirty="0"/>
+            </a:br>
             <a:endParaRPr lang="de-DE" dirty="0"/>
           </a:p>
           <a:p>
@@ -21739,43 +21800,25 @@
             </a:r>
             <a:r>
               <a:rPr lang="de-DE" dirty="0"/>
-              <a:t>: Lerne, </a:t>
-            </a:r>
-            <a:r>
-              <a:rPr lang="de-DE" dirty="0">
-                <a:ea typeface="+mn-lt"/>
-                <a:cs typeface="+mn-lt"/>
-              </a:rPr>
-              <a:t>wie man </a:t>
-            </a:r>
-            <a:r>
-              <a:rPr lang="de-DE" dirty="0" err="1">
-                <a:ea typeface="+mn-lt"/>
-                <a:cs typeface="+mn-lt"/>
-              </a:rPr>
-              <a:t>Extensions</a:t>
-            </a:r>
-            <a:r>
-              <a:rPr lang="de-DE" dirty="0">
-                <a:ea typeface="+mn-lt"/>
-                <a:cs typeface="+mn-lt"/>
-              </a:rPr>
-              <a:t> in </a:t>
-            </a:r>
-            <a:r>
-              <a:rPr lang="de-DE" dirty="0" err="1">
-                <a:ea typeface="+mn-lt"/>
-                <a:cs typeface="+mn-lt"/>
-              </a:rPr>
-              <a:t>GitLab</a:t>
-            </a:r>
-            <a:r>
-              <a:rPr lang="de-DE" dirty="0">
-                <a:ea typeface="+mn-lt"/>
-                <a:cs typeface="+mn-lt"/>
-              </a:rPr>
-              <a:t> CI/CD Pipelines verwenden kann, um den Aufbau des Codes zu verbessern.</a:t>
-            </a:r>
+              <a:t>: </a:t>
+            </a:r>
+            <a:br>
+              <a:rPr lang="de-DE" dirty="0"/>
+            </a:br>
+            <a:r>
+              <a:rPr lang="de-DE" dirty="0"/>
+              <a:t>Den Aufbau von Jobs vereinfachen,</a:t>
+            </a:r>
+            <a:br>
+              <a:rPr lang="de-DE" dirty="0"/>
+            </a:br>
+            <a:r>
+              <a:rPr lang="de-DE" dirty="0"/>
+              <a:t>in dem man Extension benutzt.</a:t>
+            </a:r>
+            <a:br>
+              <a:rPr lang="de-DE" dirty="0"/>
+            </a:br>
             <a:endParaRPr lang="de-DE" dirty="0">
               <a:cs typeface="Arial"/>
             </a:endParaRPr>
@@ -21800,43 +21843,43 @@
               <a:buChar char="•"/>
             </a:pPr>
             <a:r>
-              <a:rPr lang="de-DE" dirty="0">
+              <a:rPr lang="de-DE" sz="2400" dirty="0">
                 <a:cs typeface="Arial"/>
               </a:rPr>
               <a:t>Ersetzen Sie den </a:t>
             </a:r>
             <a:r>
-              <a:rPr lang="de-DE" dirty="0" err="1">
+              <a:rPr lang="de-DE" sz="2400" dirty="0" err="1">
                 <a:cs typeface="Arial"/>
               </a:rPr>
               <a:t>defaults</a:t>
             </a:r>
             <a:r>
-              <a:rPr lang="de-DE" dirty="0">
+              <a:rPr lang="de-DE" sz="2400" dirty="0">
                 <a:cs typeface="Arial"/>
               </a:rPr>
               <a:t> Bereich durch einen </a:t>
             </a:r>
             <a:r>
-              <a:rPr lang="de-DE" dirty="0" err="1">
+              <a:rPr lang="de-DE" sz="2400" dirty="0" err="1">
                 <a:cs typeface="Arial"/>
               </a:rPr>
               <a:t>job</a:t>
             </a:r>
             <a:r>
-              <a:rPr lang="de-DE" dirty="0">
+              <a:rPr lang="de-DE" sz="2400" dirty="0">
                 <a:cs typeface="Arial"/>
               </a:rPr>
               <a:t> in der </a:t>
             </a:r>
             <a:r>
-              <a:rPr lang="de-DE" dirty="0" err="1">
+              <a:rPr lang="de-DE" sz="2400" dirty="0" err="1">
                 <a:cs typeface="Arial"/>
               </a:rPr>
               <a:t>build</a:t>
             </a:r>
             <a:r>
-              <a:rPr lang="de-DE" dirty="0">
+              <a:rPr lang="de-DE" sz="2400" dirty="0">
                 <a:cs typeface="Arial"/>
               </a:rPr>
               <a:t> Stage</a:t>
@@ -21848,42 +21891,42 @@
               <a:buChar char="•"/>
             </a:pPr>
             <a:r>
-              <a:rPr lang="de-DE" dirty="0">
+              <a:rPr lang="de-DE" sz="2400" dirty="0">
                 <a:cs typeface="Arial"/>
               </a:rPr>
               <a:t>Lassen Sie den </a:t>
             </a:r>
             <a:r>
-              <a:rPr lang="de-DE" dirty="0" err="1">
+              <a:rPr lang="de-DE" sz="2400" dirty="0" err="1">
                 <a:cs typeface="Arial"/>
               </a:rPr>
               <a:t>build_job</a:t>
             </a:r>
             <a:r>
-              <a:rPr lang="de-DE" dirty="0">
+              <a:rPr lang="de-DE" sz="2400" dirty="0">
                 <a:cs typeface="Arial"/>
               </a:rPr>
               <a:t> diesen </a:t>
             </a:r>
             <a:r>
-              <a:rPr lang="de-DE" dirty="0" err="1">
+              <a:rPr lang="de-DE" sz="2400" dirty="0" err="1">
                 <a:cs typeface="Arial"/>
               </a:rPr>
               <a:t>job</a:t>
             </a:r>
             <a:r>
-              <a:rPr lang="de-DE" dirty="0">
+              <a:rPr lang="de-DE" sz="2400" dirty="0">
                 <a:cs typeface="Arial"/>
               </a:rPr>
               <a:t> </a:t>
             </a:r>
             <a:r>
-              <a:rPr lang="de-DE" dirty="0" err="1">
+              <a:rPr lang="de-DE" sz="2400" dirty="0" err="1">
                 <a:cs typeface="Arial"/>
               </a:rPr>
               <a:t>extenden</a:t>
             </a:r>
-            <a:endParaRPr lang="de-DE" dirty="0">
+            <a:endParaRPr lang="de-DE" sz="2400" dirty="0">
               <a:cs typeface="Arial"/>
             </a:endParaRPr>
           </a:p>
@@ -23518,6 +23561,9 @@
               <a:rPr lang="de-DE" b="1" dirty="0"/>
               <a:t>Aufgabe 8: Bedingte Ausführung von Jobs</a:t>
             </a:r>
+            <a:br>
+              <a:rPr lang="de-DE" b="1" dirty="0"/>
+            </a:br>
             <a:endParaRPr lang="de-DE" dirty="0"/>
           </a:p>
           <a:p>
@@ -23531,7 +23577,14 @@
             </a:r>
             <a:r>
               <a:rPr lang="de-DE" dirty="0"/>
-              <a:t>: Verstehe, wie man Jobs bedingt ausführt, basierend auf bestimmten Bedingungen wie </a:t>
+              <a:t>: </a:t>
+            </a:r>
+            <a:br>
+              <a:rPr lang="de-DE" dirty="0"/>
+            </a:br>
+            <a:r>
+              <a:rPr lang="de-DE" dirty="0"/>
+              <a:t>Jobs basierend auf </a:t>
             </a:r>
             <a:r>
               <a:rPr lang="de-DE" dirty="0" err="1"/>
@@ -23539,8 +23592,12 @@
             </a:r>
             <a:r>
               <a:rPr lang="de-DE" dirty="0"/>
-              <a:t> oder Tags</a:t>
-            </a:r>
+              <a:t> oder Tags nur bedingt ausführen.</a:t>
+            </a:r>
+            <a:br>
+              <a:rPr lang="de-DE" dirty="0"/>
+            </a:br>
+            <a:endParaRPr lang="de-DE" dirty="0"/>
           </a:p>
           <a:p>
             <a:pPr marL="457200" indent="-457200">
@@ -23562,15 +23619,15 @@
               <a:buChar char="•"/>
             </a:pPr>
             <a:r>
-              <a:rPr lang="de-DE" dirty="0"/>
-              <a:t>Modifiziere den </a:t>
-            </a:r>
-            <a:r>
-              <a:rPr lang="de-DE" dirty="0" err="1"/>
+              <a:rPr lang="de-DE" sz="2400" dirty="0"/>
+              <a:t>Modifizieren Sie den </a:t>
+            </a:r>
+            <a:r>
+              <a:rPr lang="de-DE" sz="2400" dirty="0" err="1"/>
               <a:t>deploy_job</a:t>
             </a:r>
             <a:r>
-              <a:rPr lang="de-DE" dirty="0"/>
+              <a:rPr lang="de-DE" sz="2400" dirty="0"/>
               <a:t>, um ihn nur auf dem main-Branch auszuführen</a:t>
             </a:r>
           </a:p>
@@ -25234,6 +25291,9 @@
               <a:rPr lang="de-DE" b="1" dirty="0"/>
               <a:t>Aufgabe 9: Parallelisierung von Jobs</a:t>
             </a:r>
+            <a:br>
+              <a:rPr lang="de-DE" b="1" dirty="0"/>
+            </a:br>
             <a:endParaRPr lang="de-DE" dirty="0"/>
           </a:p>
           <a:p>
@@ -25247,8 +25307,26 @@
             </a:r>
             <a:r>
               <a:rPr lang="de-DE" dirty="0"/>
-              <a:t>: Verstehe, wie man Jobs parallelisiert, um die CI/CD-Pipeline zu beschleunigen</a:t>
-            </a:r>
+              <a:t>: </a:t>
+            </a:r>
+            <a:br>
+              <a:rPr lang="de-DE" dirty="0"/>
+            </a:br>
+            <a:r>
+              <a:rPr lang="de-DE" dirty="0"/>
+              <a:t>CI/CD Pipeline beschleunigen, mittels </a:t>
+            </a:r>
+            <a:br>
+              <a:rPr lang="de-DE" dirty="0"/>
+            </a:br>
+            <a:r>
+              <a:rPr lang="de-DE" dirty="0"/>
+              <a:t>Parallelisierung von Jobs</a:t>
+            </a:r>
+            <a:br>
+              <a:rPr lang="de-DE" dirty="0"/>
+            </a:br>
+            <a:endParaRPr lang="de-DE" dirty="0"/>
           </a:p>
           <a:p>
             <a:pPr marL="457200" indent="-457200">
@@ -25270,8 +25348,8 @@
               <a:buChar char="•"/>
             </a:pPr>
             <a:r>
-              <a:rPr lang="de-DE" dirty="0"/>
-              <a:t>Füge mehrere Jobs in der test-Stage hinzu, die verschiedene Tests parallel ausführen</a:t>
+              <a:rPr lang="de-DE" sz="2400" dirty="0"/>
+              <a:t>Fügen Sie mehrere Jobs in der test-Stage hinzu, die verschiedene Tests parallel ausführen</a:t>
             </a:r>
           </a:p>
           <a:p>

</xml_diff>